<commit_message>
Updated CCC slide deck
</commit_message>
<xml_diff>
--- a/Getting Started with ASP.NET Core 1.0 in VS Code - CCC.pptx
+++ b/Getting Started with ASP.NET Core 1.0 in VS Code - CCC.pptx
@@ -6,37 +6,74 @@
     <p:sldMasterId id="2147483694" r:id="rId2"/>
   </p:sldMasterIdLst>
   <p:notesMasterIdLst>
-    <p:notesMasterId r:id="rId28"/>
+    <p:notesMasterId r:id="rId29"/>
   </p:notesMasterIdLst>
   <p:sldIdLst>
     <p:sldId id="299" r:id="rId3"/>
     <p:sldId id="256" r:id="rId4"/>
-    <p:sldId id="259" r:id="rId5"/>
-    <p:sldId id="284" r:id="rId6"/>
-    <p:sldId id="265" r:id="rId7"/>
-    <p:sldId id="276" r:id="rId8"/>
-    <p:sldId id="275" r:id="rId9"/>
-    <p:sldId id="269" r:id="rId10"/>
-    <p:sldId id="277" r:id="rId11"/>
-    <p:sldId id="270" r:id="rId12"/>
-    <p:sldId id="278" r:id="rId13"/>
-    <p:sldId id="279" r:id="rId14"/>
-    <p:sldId id="281" r:id="rId15"/>
-    <p:sldId id="282" r:id="rId16"/>
-    <p:sldId id="293" r:id="rId17"/>
-    <p:sldId id="286" r:id="rId18"/>
-    <p:sldId id="287" r:id="rId19"/>
-    <p:sldId id="294" r:id="rId20"/>
-    <p:sldId id="296" r:id="rId21"/>
-    <p:sldId id="295" r:id="rId22"/>
-    <p:sldId id="285" r:id="rId23"/>
-    <p:sldId id="290" r:id="rId24"/>
-    <p:sldId id="260" r:id="rId25"/>
-    <p:sldId id="297" r:id="rId26"/>
-    <p:sldId id="273" r:id="rId27"/>
+    <p:sldId id="300" r:id="rId5"/>
+    <p:sldId id="259" r:id="rId6"/>
+    <p:sldId id="284" r:id="rId7"/>
+    <p:sldId id="265" r:id="rId8"/>
+    <p:sldId id="276" r:id="rId9"/>
+    <p:sldId id="275" r:id="rId10"/>
+    <p:sldId id="269" r:id="rId11"/>
+    <p:sldId id="277" r:id="rId12"/>
+    <p:sldId id="270" r:id="rId13"/>
+    <p:sldId id="278" r:id="rId14"/>
+    <p:sldId id="279" r:id="rId15"/>
+    <p:sldId id="281" r:id="rId16"/>
+    <p:sldId id="282" r:id="rId17"/>
+    <p:sldId id="293" r:id="rId18"/>
+    <p:sldId id="286" r:id="rId19"/>
+    <p:sldId id="287" r:id="rId20"/>
+    <p:sldId id="294" r:id="rId21"/>
+    <p:sldId id="296" r:id="rId22"/>
+    <p:sldId id="295" r:id="rId23"/>
+    <p:sldId id="285" r:id="rId24"/>
+    <p:sldId id="290" r:id="rId25"/>
+    <p:sldId id="260" r:id="rId26"/>
+    <p:sldId id="297" r:id="rId27"/>
+    <p:sldId id="273" r:id="rId28"/>
   </p:sldIdLst>
   <p:sldSz cx="12192000" cy="6858000"/>
   <p:notesSz cx="6858000" cy="9144000"/>
+  <p:custShowLst>
+    <p:custShow name="Rotating Slides" id="0">
+      <p:sldLst>
+        <p:sld r:id="rId3"/>
+        <p:sld r:id="rId4"/>
+      </p:sldLst>
+    </p:custShow>
+    <p:custShow name="Main Slides" id="1">
+      <p:sldLst>
+        <p:sld r:id="rId5"/>
+        <p:sld r:id="rId6"/>
+        <p:sld r:id="rId7"/>
+        <p:sld r:id="rId8"/>
+        <p:sld r:id="rId9"/>
+        <p:sld r:id="rId10"/>
+        <p:sld r:id="rId11"/>
+        <p:sld r:id="rId12"/>
+        <p:sld r:id="rId13"/>
+        <p:sld r:id="rId14"/>
+        <p:sld r:id="rId15"/>
+        <p:sld r:id="rId16"/>
+        <p:sld r:id="rId17"/>
+        <p:sld r:id="rId18"/>
+        <p:sld r:id="rId19"/>
+        <p:sld r:id="rId20"/>
+        <p:sld r:id="rId21"/>
+        <p:sld r:id="rId22"/>
+        <p:sld r:id="rId23"/>
+        <p:sld r:id="rId24"/>
+        <p:sld r:id="rId25"/>
+        <p:sld r:id="rId26"/>
+        <p:sld r:id="rId27"/>
+        <p:sld r:id="rId28"/>
+      </p:sldLst>
+    </p:custShow>
+  </p:custShowLst>
   <p:defaultTextStyle>
     <a:defPPr>
       <a:defRPr lang="en-US"/>
@@ -133,6 +170,44 @@
     </a:lvl9pPr>
   </p:defaultTextStyle>
   <p:extLst>
+    <p:ext uri="{521415D9-36F7-43E2-AB2F-B90AF26B5E84}">
+      <p14:sectionLst xmlns:p14="http://schemas.microsoft.com/office/powerpoint/2010/main">
+        <p14:section name="Rotating Slides" id="{D1A6F68D-9D95-4BFC-BE70-6BD1D346AE08}">
+          <p14:sldIdLst>
+            <p14:sldId id="299"/>
+            <p14:sldId id="256"/>
+          </p14:sldIdLst>
+        </p14:section>
+        <p14:section name="Main Slides" id="{59353075-BFFF-4274-9BA9-67D549D220FC}">
+          <p14:sldIdLst>
+            <p14:sldId id="300"/>
+            <p14:sldId id="259"/>
+            <p14:sldId id="284"/>
+            <p14:sldId id="265"/>
+            <p14:sldId id="276"/>
+            <p14:sldId id="275"/>
+            <p14:sldId id="269"/>
+            <p14:sldId id="277"/>
+            <p14:sldId id="270"/>
+            <p14:sldId id="278"/>
+            <p14:sldId id="279"/>
+            <p14:sldId id="281"/>
+            <p14:sldId id="282"/>
+            <p14:sldId id="293"/>
+            <p14:sldId id="286"/>
+            <p14:sldId id="287"/>
+            <p14:sldId id="294"/>
+            <p14:sldId id="296"/>
+            <p14:sldId id="295"/>
+            <p14:sldId id="285"/>
+            <p14:sldId id="290"/>
+            <p14:sldId id="260"/>
+            <p14:sldId id="297"/>
+            <p14:sldId id="273"/>
+          </p14:sldIdLst>
+        </p14:section>
+      </p14:sectionLst>
+    </p:ext>
     <p:ext uri="{EFAFB233-063F-42B5-8137-9DF3F51BA10A}">
       <p15:sldGuideLst xmlns:p15="http://schemas.microsoft.com/office/powerpoint/2012/main">
         <p15:guide id="1" orient="horz" pos="2160" userDrawn="1">
@@ -4131,8 +4206,8 @@
     <dgm:cxn modelId="{BE4D6236-A3E0-4057-9A2C-42D4A877D36E}" type="presOf" srcId="{8A45336E-5408-4D62-9EF1-08F486318BFF}" destId="{57863176-DB12-4225-A941-96CD5A6A82CC}" srcOrd="0" destOrd="0" presId="urn:microsoft.com/office/officeart/2005/8/layout/hChevron3"/>
     <dgm:cxn modelId="{1C1D83E0-DB0F-4A9B-A04D-A392BE0DD04C}" type="presOf" srcId="{AFF4B1FA-9A6B-43F7-B8CB-4C91CF1DDBE0}" destId="{6E8A8CB1-126C-4A8D-95E5-7D016B2029F2}" srcOrd="0" destOrd="0" presId="urn:microsoft.com/office/officeart/2005/8/layout/hChevron3"/>
     <dgm:cxn modelId="{DCD6A15A-B19C-4616-9ED1-26DCB2C43285}" srcId="{8A45336E-5408-4D62-9EF1-08F486318BFF}" destId="{8BEAE8CB-A7D8-45E4-BC87-9A18CED7E7CE}" srcOrd="0" destOrd="0" parTransId="{E16CB781-B1BB-4E9E-9C86-96F481B14BFA}" sibTransId="{48747E02-CA4B-4EA6-9401-0110B1D75C1C}"/>
+    <dgm:cxn modelId="{C70A686A-14B0-4CBB-AA56-4BFD6C2C7B89}" type="presOf" srcId="{766D0765-5B45-432B-826E-9A27A845A5A7}" destId="{F0AA213A-C7FF-4409-B147-991ABB26AAB2}" srcOrd="0" destOrd="0" presId="urn:microsoft.com/office/officeart/2005/8/layout/hChevron3"/>
     <dgm:cxn modelId="{94C1853C-02E7-4C27-A29A-FC84C3187A32}" srcId="{8A45336E-5408-4D62-9EF1-08F486318BFF}" destId="{A917A1F9-17B7-4B88-9FAD-AF41E2910DBD}" srcOrd="3" destOrd="0" parTransId="{FEFD055D-8110-41D2-83FF-BB68E3C24098}" sibTransId="{A2ABC1CA-D4DB-4C0F-83FD-5DAA1C23AAEA}"/>
-    <dgm:cxn modelId="{C70A686A-14B0-4CBB-AA56-4BFD6C2C7B89}" type="presOf" srcId="{766D0765-5B45-432B-826E-9A27A845A5A7}" destId="{F0AA213A-C7FF-4409-B147-991ABB26AAB2}" srcOrd="0" destOrd="0" presId="urn:microsoft.com/office/officeart/2005/8/layout/hChevron3"/>
     <dgm:cxn modelId="{9CC9A370-689E-4C6F-B870-78ECD0BA24BE}" type="presOf" srcId="{A917A1F9-17B7-4B88-9FAD-AF41E2910DBD}" destId="{6655FB27-B27C-4A7B-B55D-EF2C08C6B65E}" srcOrd="0" destOrd="0" presId="urn:microsoft.com/office/officeart/2005/8/layout/hChevron3"/>
     <dgm:cxn modelId="{128E7390-4262-4560-BB4D-C552847BC8AE}" type="presOf" srcId="{8BEAE8CB-A7D8-45E4-BC87-9A18CED7E7CE}" destId="{54F0ADA0-D0DF-4213-9ACF-ED13172B50C7}" srcOrd="0" destOrd="0" presId="urn:microsoft.com/office/officeart/2005/8/layout/hChevron3"/>
     <dgm:cxn modelId="{CB4508D6-DCB1-41A9-9031-BAB1F7FDDC1E}" type="presParOf" srcId="{57863176-DB12-4225-A941-96CD5A6A82CC}" destId="{54F0ADA0-D0DF-4213-9ACF-ED13172B50C7}" srcOrd="0" destOrd="0" presId="urn:microsoft.com/office/officeart/2005/8/layout/hChevron3"/>
@@ -12932,6 +13007,90 @@
 </p:notes>
 </file>
 
+<file path=ppt/notesSlides/notesSlide2.xml><?xml version="1.0" encoding="utf-8"?>
+<p:notes xmlns:a="http://schemas.openxmlformats.org/drawingml/2006/main" xmlns:r="http://schemas.openxmlformats.org/officeDocument/2006/relationships" xmlns:p="http://schemas.openxmlformats.org/presentationml/2006/main">
+  <p:cSld>
+    <p:spTree>
+      <p:nvGrpSpPr>
+        <p:cNvPr id="1" name=""/>
+        <p:cNvGrpSpPr/>
+        <p:nvPr/>
+      </p:nvGrpSpPr>
+      <p:grpSpPr>
+        <a:xfrm>
+          <a:off x="0" y="0"/>
+          <a:ext cx="0" cy="0"/>
+          <a:chOff x="0" y="0"/>
+          <a:chExt cx="0" cy="0"/>
+        </a:xfrm>
+      </p:grpSpPr>
+      <p:sp>
+        <p:nvSpPr>
+          <p:cNvPr id="2" name="Slide Image Placeholder 1"/>
+          <p:cNvSpPr>
+            <a:spLocks noGrp="1" noRot="1" noChangeAspect="1"/>
+          </p:cNvSpPr>
+          <p:nvPr>
+            <p:ph type="sldImg"/>
+          </p:nvPr>
+        </p:nvSpPr>
+        <p:spPr/>
+      </p:sp>
+      <p:sp>
+        <p:nvSpPr>
+          <p:cNvPr id="3" name="Notes Placeholder 2"/>
+          <p:cNvSpPr>
+            <a:spLocks noGrp="1"/>
+          </p:cNvSpPr>
+          <p:nvPr>
+            <p:ph type="body" idx="1"/>
+          </p:nvPr>
+        </p:nvSpPr>
+        <p:spPr/>
+        <p:txBody>
+          <a:bodyPr/>
+          <a:lstStyle/>
+          <a:p>
+            <a:endParaRPr lang="en-US" dirty="0"/>
+          </a:p>
+        </p:txBody>
+      </p:sp>
+      <p:sp>
+        <p:nvSpPr>
+          <p:cNvPr id="4" name="Slide Number Placeholder 3"/>
+          <p:cNvSpPr>
+            <a:spLocks noGrp="1"/>
+          </p:cNvSpPr>
+          <p:nvPr>
+            <p:ph type="sldNum" sz="quarter" idx="10"/>
+          </p:nvPr>
+        </p:nvSpPr>
+        <p:spPr/>
+        <p:txBody>
+          <a:bodyPr/>
+          <a:lstStyle/>
+          <a:p>
+            <a:fld id="{1F58D3C7-24AC-4339-9709-4FC2EF967D00}" type="slidenum">
+              <a:rPr lang="en-US" smtClean="0"/>
+              <a:t>3</a:t>
+            </a:fld>
+            <a:endParaRPr lang="en-US" dirty="0"/>
+          </a:p>
+        </p:txBody>
+      </p:sp>
+    </p:spTree>
+    <p:extLst>
+      <p:ext uri="{BB962C8B-B14F-4D97-AF65-F5344CB8AC3E}">
+        <p14:creationId xmlns:p14="http://schemas.microsoft.com/office/powerpoint/2010/main" val="2204356942"/>
+      </p:ext>
+    </p:extLst>
+  </p:cSld>
+  <p:clrMapOvr>
+    <a:masterClrMapping/>
+  </p:clrMapOvr>
+</p:notes>
+</file>
+
 <file path=ppt/slideLayouts/slideLayout1.xml><?xml version="1.0" encoding="utf-8"?>
 <p:sldLayout xmlns:a="http://schemas.openxmlformats.org/drawingml/2006/main" xmlns:r="http://schemas.openxmlformats.org/officeDocument/2006/relationships" xmlns:p="http://schemas.openxmlformats.org/presentationml/2006/main" showMasterSp="0" type="title" preserve="1">
   <p:cSld name="Title Slide">
@@ -21579,8 +21738,8 @@
   <p:clrMapOvr>
     <a:masterClrMapping/>
   </p:clrMapOvr>
-  <p:transition spd="slow">
-    <p:wipe dir="r"/>
+  <p:transition spd="med" advTm="8000">
+    <p:pull/>
   </p:transition>
 </p:sld>
 </file>
@@ -21619,7 +21778,7 @@
           <a:p>
             <a:r>
               <a:rPr lang="en-US" dirty="0"/>
-              <a:t>DNU</a:t>
+              <a:t>DNX – Start Web Server</a:t>
             </a:r>
           </a:p>
         </p:txBody>
@@ -21644,117 +21803,24 @@
           <a:bodyPr/>
           <a:lstStyle/>
           <a:p>
-            <a:r>
-              <a:rPr lang="en-US" sz="2000" dirty="0"/>
-              <a:t>NuGet Package Restore</a:t>
-            </a:r>
-          </a:p>
-          <a:p>
-            <a:pPr marL="457200" lvl="1" indent="0">
+            <a:pPr marL="0" indent="0">
+              <a:buNone/>
+            </a:pPr>
+            <a:endParaRPr lang="en-US" b="1" dirty="0">
+              <a:latin typeface="Consolas" panose="020B0609020204030204" pitchFamily="49" charset="0"/>
+              <a:cs typeface="Consolas" panose="020B0609020204030204" pitchFamily="49" charset="0"/>
+            </a:endParaRPr>
+          </a:p>
+          <a:p>
+            <a:pPr marL="0" indent="0">
               <a:buNone/>
             </a:pPr>
             <a:r>
-              <a:rPr lang="en-US" sz="1800" b="1" dirty="0">
+              <a:rPr lang="en-US" b="1" dirty="0">
                 <a:latin typeface="Consolas" panose="020B0609020204030204" pitchFamily="49" charset="0"/>
                 <a:cs typeface="Consolas" panose="020B0609020204030204" pitchFamily="49" charset="0"/>
               </a:rPr>
-              <a:t>&gt; dnu restore</a:t>
-            </a:r>
-          </a:p>
-          <a:p>
-            <a:r>
-              <a:rPr lang="en-US" sz="2000" dirty="0"/>
-              <a:t>Build App</a:t>
-            </a:r>
-          </a:p>
-          <a:p>
-            <a:pPr marL="457200" lvl="1" indent="0">
-              <a:buNone/>
-            </a:pPr>
-            <a:r>
-              <a:rPr lang="en-US" sz="1800" b="1" dirty="0">
-                <a:latin typeface="Consolas" panose="020B0609020204030204" pitchFamily="49" charset="0"/>
-                <a:cs typeface="Consolas" panose="020B0609020204030204" pitchFamily="49" charset="0"/>
-              </a:rPr>
-              <a:t>&gt;</a:t>
-            </a:r>
-            <a:r>
-              <a:rPr lang="en-US" sz="1800" dirty="0">
-                <a:latin typeface="Consolas" panose="020B0609020204030204" pitchFamily="49" charset="0"/>
-                <a:cs typeface="Consolas" panose="020B0609020204030204" pitchFamily="49" charset="0"/>
-              </a:rPr>
-              <a:t> </a:t>
-            </a:r>
-            <a:r>
-              <a:rPr lang="en-US" sz="1800" b="1" dirty="0">
-                <a:latin typeface="Consolas" panose="020B0609020204030204" pitchFamily="49" charset="0"/>
-                <a:cs typeface="Consolas" panose="020B0609020204030204" pitchFamily="49" charset="0"/>
-              </a:rPr>
-              <a:t>dnu build</a:t>
-            </a:r>
-          </a:p>
-          <a:p>
-            <a:r>
-              <a:rPr lang="en-US" sz="2000" dirty="0"/>
-              <a:t>Commands Management</a:t>
-            </a:r>
-          </a:p>
-          <a:p>
-            <a:pPr marL="457200" lvl="1" indent="0">
-              <a:buNone/>
-            </a:pPr>
-            <a:r>
-              <a:rPr lang="en-US" sz="1800" b="1" dirty="0">
-                <a:latin typeface="Consolas" panose="020B0609020204030204" pitchFamily="49" charset="0"/>
-                <a:cs typeface="Consolas" panose="020B0609020204030204" pitchFamily="49" charset="0"/>
-              </a:rPr>
-              <a:t>&gt;</a:t>
-            </a:r>
-            <a:r>
-              <a:rPr lang="en-US" sz="1800" dirty="0">
-                <a:latin typeface="Consolas" panose="020B0609020204030204" pitchFamily="49" charset="0"/>
-                <a:cs typeface="Consolas" panose="020B0609020204030204" pitchFamily="49" charset="0"/>
-              </a:rPr>
-              <a:t> </a:t>
-            </a:r>
-            <a:r>
-              <a:rPr lang="en-US" sz="1800" b="1" dirty="0">
-                <a:latin typeface="Consolas" panose="020B0609020204030204" pitchFamily="49" charset="0"/>
-                <a:cs typeface="Consolas" panose="020B0609020204030204" pitchFamily="49" charset="0"/>
-              </a:rPr>
-              <a:t>dnu install</a:t>
-            </a:r>
-          </a:p>
-          <a:p>
-            <a:r>
-              <a:rPr lang="en-US" sz="2000" dirty="0"/>
-              <a:t>Publish App</a:t>
-            </a:r>
-          </a:p>
-          <a:p>
-            <a:pPr marL="457200" lvl="1" indent="0">
-              <a:buNone/>
-            </a:pPr>
-            <a:r>
-              <a:rPr lang="en-US" sz="1800" b="1" dirty="0">
-                <a:latin typeface="Consolas" panose="020B0609020204030204" pitchFamily="49" charset="0"/>
-                <a:cs typeface="Consolas" panose="020B0609020204030204" pitchFamily="49" charset="0"/>
-              </a:rPr>
-              <a:t>&gt;</a:t>
-            </a:r>
-            <a:r>
-              <a:rPr lang="en-US" sz="1800" dirty="0">
-                <a:latin typeface="Consolas" panose="020B0609020204030204" pitchFamily="49" charset="0"/>
-                <a:cs typeface="Consolas" panose="020B0609020204030204" pitchFamily="49" charset="0"/>
-              </a:rPr>
-              <a:t> </a:t>
-            </a:r>
-            <a:r>
-              <a:rPr lang="en-US" sz="1800" b="1" dirty="0">
-                <a:latin typeface="Consolas" panose="020B0609020204030204" pitchFamily="49" charset="0"/>
-                <a:cs typeface="Consolas" panose="020B0609020204030204" pitchFamily="49" charset="0"/>
-              </a:rPr>
-              <a:t>dnu publish</a:t>
+              <a:t>&gt; dnx web</a:t>
             </a:r>
           </a:p>
         </p:txBody>
@@ -21784,7 +21850,7 @@
       </p:sp>
       <p:pic>
         <p:nvPicPr>
-          <p:cNvPr id="7" name="Picture 6"/>
+          <p:cNvPr id="6" name="Picture 5"/>
           <p:cNvPicPr>
             <a:picLocks noChangeAspect="1"/>
           </p:cNvPicPr>
@@ -21798,18 +21864,248 @@
         </p:blipFill>
         <p:spPr>
           <a:xfrm>
-            <a:off x="4579397" y="1636050"/>
-            <a:ext cx="9854318" cy="4405312"/>
+            <a:off x="390253" y="3589860"/>
+            <a:ext cx="5053693" cy="1563339"/>
           </a:xfrm>
           <a:prstGeom prst="rect">
             <a:avLst/>
           </a:prstGeom>
         </p:spPr>
       </p:pic>
+      <mc:AlternateContent xmlns:mc="http://schemas.openxmlformats.org/markup-compatibility/2006" xmlns:we="http://schemas.microsoft.com/office/webextensions/webextension/2010/11" xmlns:pca="http://schemas.microsoft.com/office/powerpoint/2013/contentapp">
+        <mc:Choice Requires="we pca">
+          <p:graphicFrame>
+            <p:nvGraphicFramePr>
+              <p:cNvPr id="7" name="Add-in 6" title="Code Presenter Pro"/>
+              <p:cNvGraphicFramePr>
+                <a:graphicFrameLocks noGrp="1"/>
+              </p:cNvGraphicFramePr>
+              <p:nvPr>
+                <p:extLst>
+                  <p:ext uri="{D42A27DB-BD31-4B8C-83A1-F6EECF244321}">
+                    <p14:modId xmlns:p14="http://schemas.microsoft.com/office/powerpoint/2010/main" val="3251799261"/>
+                  </p:ext>
+                </p:extLst>
+              </p:nvPr>
+            </p:nvGraphicFramePr>
+            <p:xfrm>
+              <a:off x="3505194" y="1891623"/>
+              <a:ext cx="6055889" cy="1651677"/>
+            </p:xfrm>
+            <a:graphic>
+              <a:graphicData uri="http://schemas.microsoft.com/office/webextensions/webextension/2010/11">
+                <we:webextensionref xmlns:we="http://schemas.microsoft.com/office/webextensions/webextension/2010/11" xmlns:r="http://schemas.openxmlformats.org/officeDocument/2006/relationships" r:id="rId3"/>
+              </a:graphicData>
+            </a:graphic>
+          </p:graphicFrame>
+        </mc:Choice>
+        <mc:Fallback xmlns="">
+          <p:pic>
+            <p:nvPicPr>
+              <p:cNvPr id="7" name="Add-in 6" title="Code Presenter Pro"/>
+              <p:cNvPicPr>
+                <a:picLocks noGrp="1" noRot="1" noChangeAspect="1" noMove="1" noResize="1" noEditPoints="1" noAdjustHandles="1" noChangeArrowheads="1" noChangeShapeType="1"/>
+              </p:cNvPicPr>
+              <p:nvPr/>
+            </p:nvPicPr>
+            <p:blipFill>
+              <a:blip r:embed="rId4"/>
+              <a:stretch>
+                <a:fillRect/>
+              </a:stretch>
+            </p:blipFill>
+            <p:spPr>
+              <a:xfrm>
+                <a:off x="3505194" y="1891623"/>
+                <a:ext cx="6055889" cy="1651677"/>
+              </a:xfrm>
+              <a:prstGeom prst="rect">
+                <a:avLst/>
+              </a:prstGeom>
+            </p:spPr>
+          </p:pic>
+        </mc:Fallback>
+      </mc:AlternateContent>
+      <p:sp>
+        <p:nvSpPr>
+          <p:cNvPr id="8" name="Right Arrow 7"/>
+          <p:cNvSpPr/>
+          <p:nvPr/>
+        </p:nvSpPr>
+        <p:spPr>
+          <a:xfrm>
+            <a:off x="2111828" y="1977801"/>
+            <a:ext cx="1225720" cy="458786"/>
+          </a:xfrm>
+          <a:prstGeom prst="rightArrow">
+            <a:avLst/>
+          </a:prstGeom>
+        </p:spPr>
+        <p:style>
+          <a:lnRef idx="1">
+            <a:schemeClr val="accent2"/>
+          </a:lnRef>
+          <a:fillRef idx="2">
+            <a:schemeClr val="accent2"/>
+          </a:fillRef>
+          <a:effectRef idx="1">
+            <a:schemeClr val="accent2"/>
+          </a:effectRef>
+          <a:fontRef idx="minor">
+            <a:schemeClr val="dk1"/>
+          </a:fontRef>
+        </p:style>
+        <p:txBody>
+          <a:bodyPr rtlCol="0" anchor="ctr"/>
+          <a:lstStyle/>
+          <a:p>
+            <a:pPr algn="ctr"/>
+            <a:r>
+              <a:rPr lang="en-US" dirty="0"/>
+              <a:t>Execute</a:t>
+            </a:r>
+          </a:p>
+        </p:txBody>
+      </p:sp>
+      <p:sp>
+        <p:nvSpPr>
+          <p:cNvPr id="9" name="TextBox 8"/>
+          <p:cNvSpPr txBox="1"/>
+          <p:nvPr/>
+        </p:nvSpPr>
+        <p:spPr>
+          <a:xfrm>
+            <a:off x="3429867" y="1505345"/>
+            <a:ext cx="5897371" cy="369332"/>
+          </a:xfrm>
+          <a:prstGeom prst="rect">
+            <a:avLst/>
+          </a:prstGeom>
+          <a:noFill/>
+        </p:spPr>
+        <p:txBody>
+          <a:bodyPr wrap="square" rtlCol="0">
+            <a:spAutoFit/>
+          </a:bodyPr>
+          <a:lstStyle/>
+          <a:p>
+            <a:r>
+              <a:rPr lang="en-US" u="sng" dirty="0"/>
+              <a:t>project.json</a:t>
+            </a:r>
+          </a:p>
+        </p:txBody>
+      </p:sp>
+      <p:sp>
+        <p:nvSpPr>
+          <p:cNvPr id="10" name="Left Arrow 9"/>
+          <p:cNvSpPr/>
+          <p:nvPr/>
+        </p:nvSpPr>
+        <p:spPr>
+          <a:xfrm rot="19188924">
+            <a:off x="2488007" y="2828227"/>
+            <a:ext cx="985157" cy="510891"/>
+          </a:xfrm>
+          <a:prstGeom prst="leftArrow">
+            <a:avLst/>
+          </a:prstGeom>
+        </p:spPr>
+        <p:style>
+          <a:lnRef idx="1">
+            <a:schemeClr val="accent2"/>
+          </a:lnRef>
+          <a:fillRef idx="2">
+            <a:schemeClr val="accent2"/>
+          </a:fillRef>
+          <a:effectRef idx="1">
+            <a:schemeClr val="accent2"/>
+          </a:effectRef>
+          <a:fontRef idx="minor">
+            <a:schemeClr val="dk1"/>
+          </a:fontRef>
+        </p:style>
+        <p:txBody>
+          <a:bodyPr rtlCol="0" anchor="ctr"/>
+          <a:lstStyle/>
+          <a:p>
+            <a:pPr algn="ctr"/>
+            <a:r>
+              <a:rPr lang="en-US" dirty="0"/>
+              <a:t>Start</a:t>
+            </a:r>
+          </a:p>
+        </p:txBody>
+      </p:sp>
+      <p:pic>
+        <p:nvPicPr>
+          <p:cNvPr id="11" name="Picture 10"/>
+          <p:cNvPicPr>
+            <a:picLocks noChangeAspect="1"/>
+          </p:cNvPicPr>
+          <p:nvPr/>
+        </p:nvPicPr>
+        <p:blipFill>
+          <a:blip r:embed="rId5"/>
+          <a:stretch>
+            <a:fillRect/>
+          </a:stretch>
+        </p:blipFill>
+        <p:spPr>
+          <a:xfrm>
+            <a:off x="6825644" y="3589860"/>
+            <a:ext cx="9614505" cy="7589894"/>
+          </a:xfrm>
+          <a:prstGeom prst="rect">
+            <a:avLst/>
+          </a:prstGeom>
+        </p:spPr>
+      </p:pic>
+      <p:sp>
+        <p:nvSpPr>
+          <p:cNvPr id="13" name="Right Arrow 12"/>
+          <p:cNvSpPr/>
+          <p:nvPr/>
+        </p:nvSpPr>
+        <p:spPr>
+          <a:xfrm>
+            <a:off x="5520456" y="4040809"/>
+            <a:ext cx="1225720" cy="458786"/>
+          </a:xfrm>
+          <a:prstGeom prst="rightArrow">
+            <a:avLst/>
+          </a:prstGeom>
+        </p:spPr>
+        <p:style>
+          <a:lnRef idx="1">
+            <a:schemeClr val="accent2"/>
+          </a:lnRef>
+          <a:fillRef idx="2">
+            <a:schemeClr val="accent2"/>
+          </a:fillRef>
+          <a:effectRef idx="1">
+            <a:schemeClr val="accent2"/>
+          </a:effectRef>
+          <a:fontRef idx="minor">
+            <a:schemeClr val="dk1"/>
+          </a:fontRef>
+        </p:style>
+        <p:txBody>
+          <a:bodyPr rtlCol="0" anchor="ctr"/>
+          <a:lstStyle/>
+          <a:p>
+            <a:pPr algn="ctr"/>
+            <a:r>
+              <a:rPr lang="en-US" dirty="0"/>
+              <a:t>Browse</a:t>
+            </a:r>
+          </a:p>
+        </p:txBody>
+      </p:sp>
     </p:spTree>
     <p:extLst>
       <p:ext uri="{BB962C8B-B14F-4D97-AF65-F5344CB8AC3E}">
-        <p14:creationId xmlns:p14="http://schemas.microsoft.com/office/powerpoint/2010/main" val="3685970426"/>
+        <p14:creationId xmlns:p14="http://schemas.microsoft.com/office/powerpoint/2010/main" val="21192055"/>
       </p:ext>
     </p:extLst>
   </p:cSld>
@@ -21853,6 +22149,240 @@
           <a:p>
             <a:r>
               <a:rPr lang="en-US" dirty="0"/>
+              <a:t>DNU</a:t>
+            </a:r>
+          </a:p>
+        </p:txBody>
+      </p:sp>
+      <p:sp>
+        <p:nvSpPr>
+          <p:cNvPr id="3" name="Content Placeholder 2"/>
+          <p:cNvSpPr>
+            <a:spLocks noGrp="1"/>
+          </p:cNvSpPr>
+          <p:nvPr>
+            <p:ph idx="1"/>
+          </p:nvPr>
+        </p:nvSpPr>
+        <p:spPr>
+          <a:xfrm>
+            <a:off x="677334" y="1595439"/>
+            <a:ext cx="8596668" cy="4445924"/>
+          </a:xfrm>
+        </p:spPr>
+        <p:txBody>
+          <a:bodyPr/>
+          <a:lstStyle/>
+          <a:p>
+            <a:r>
+              <a:rPr lang="en-US" sz="2000" dirty="0"/>
+              <a:t>NuGet Package Restore</a:t>
+            </a:r>
+          </a:p>
+          <a:p>
+            <a:pPr marL="457200" lvl="1" indent="0">
+              <a:buNone/>
+            </a:pPr>
+            <a:r>
+              <a:rPr lang="en-US" sz="1800" b="1" dirty="0">
+                <a:latin typeface="Consolas" panose="020B0609020204030204" pitchFamily="49" charset="0"/>
+                <a:cs typeface="Consolas" panose="020B0609020204030204" pitchFamily="49" charset="0"/>
+              </a:rPr>
+              <a:t>&gt; dnu restore</a:t>
+            </a:r>
+          </a:p>
+          <a:p>
+            <a:r>
+              <a:rPr lang="en-US" sz="2000" dirty="0"/>
+              <a:t>Build App</a:t>
+            </a:r>
+          </a:p>
+          <a:p>
+            <a:pPr marL="457200" lvl="1" indent="0">
+              <a:buNone/>
+            </a:pPr>
+            <a:r>
+              <a:rPr lang="en-US" sz="1800" b="1" dirty="0">
+                <a:latin typeface="Consolas" panose="020B0609020204030204" pitchFamily="49" charset="0"/>
+                <a:cs typeface="Consolas" panose="020B0609020204030204" pitchFamily="49" charset="0"/>
+              </a:rPr>
+              <a:t>&gt;</a:t>
+            </a:r>
+            <a:r>
+              <a:rPr lang="en-US" sz="1800" dirty="0">
+                <a:latin typeface="Consolas" panose="020B0609020204030204" pitchFamily="49" charset="0"/>
+                <a:cs typeface="Consolas" panose="020B0609020204030204" pitchFamily="49" charset="0"/>
+              </a:rPr>
+              <a:t> </a:t>
+            </a:r>
+            <a:r>
+              <a:rPr lang="en-US" sz="1800" b="1" dirty="0">
+                <a:latin typeface="Consolas" panose="020B0609020204030204" pitchFamily="49" charset="0"/>
+                <a:cs typeface="Consolas" panose="020B0609020204030204" pitchFamily="49" charset="0"/>
+              </a:rPr>
+              <a:t>dnu build</a:t>
+            </a:r>
+          </a:p>
+          <a:p>
+            <a:r>
+              <a:rPr lang="en-US" sz="2000" dirty="0"/>
+              <a:t>Commands Management</a:t>
+            </a:r>
+          </a:p>
+          <a:p>
+            <a:pPr marL="457200" lvl="1" indent="0">
+              <a:buNone/>
+            </a:pPr>
+            <a:r>
+              <a:rPr lang="en-US" sz="1800" b="1" dirty="0">
+                <a:latin typeface="Consolas" panose="020B0609020204030204" pitchFamily="49" charset="0"/>
+                <a:cs typeface="Consolas" panose="020B0609020204030204" pitchFamily="49" charset="0"/>
+              </a:rPr>
+              <a:t>&gt;</a:t>
+            </a:r>
+            <a:r>
+              <a:rPr lang="en-US" sz="1800" dirty="0">
+                <a:latin typeface="Consolas" panose="020B0609020204030204" pitchFamily="49" charset="0"/>
+                <a:cs typeface="Consolas" panose="020B0609020204030204" pitchFamily="49" charset="0"/>
+              </a:rPr>
+              <a:t> </a:t>
+            </a:r>
+            <a:r>
+              <a:rPr lang="en-US" sz="1800" b="1" dirty="0">
+                <a:latin typeface="Consolas" panose="020B0609020204030204" pitchFamily="49" charset="0"/>
+                <a:cs typeface="Consolas" panose="020B0609020204030204" pitchFamily="49" charset="0"/>
+              </a:rPr>
+              <a:t>dnu install</a:t>
+            </a:r>
+          </a:p>
+          <a:p>
+            <a:r>
+              <a:rPr lang="en-US" sz="2000" dirty="0"/>
+              <a:t>Publish App</a:t>
+            </a:r>
+          </a:p>
+          <a:p>
+            <a:pPr marL="457200" lvl="1" indent="0">
+              <a:buNone/>
+            </a:pPr>
+            <a:r>
+              <a:rPr lang="en-US" sz="1800" b="1" dirty="0">
+                <a:latin typeface="Consolas" panose="020B0609020204030204" pitchFamily="49" charset="0"/>
+                <a:cs typeface="Consolas" panose="020B0609020204030204" pitchFamily="49" charset="0"/>
+              </a:rPr>
+              <a:t>&gt;</a:t>
+            </a:r>
+            <a:r>
+              <a:rPr lang="en-US" sz="1800" dirty="0">
+                <a:latin typeface="Consolas" panose="020B0609020204030204" pitchFamily="49" charset="0"/>
+                <a:cs typeface="Consolas" panose="020B0609020204030204" pitchFamily="49" charset="0"/>
+              </a:rPr>
+              <a:t> </a:t>
+            </a:r>
+            <a:r>
+              <a:rPr lang="en-US" sz="1800" b="1" dirty="0">
+                <a:latin typeface="Consolas" panose="020B0609020204030204" pitchFamily="49" charset="0"/>
+                <a:cs typeface="Consolas" panose="020B0609020204030204" pitchFamily="49" charset="0"/>
+              </a:rPr>
+              <a:t>dnu publish</a:t>
+            </a:r>
+          </a:p>
+        </p:txBody>
+      </p:sp>
+      <p:sp>
+        <p:nvSpPr>
+          <p:cNvPr id="4" name="Slide Number Placeholder 3"/>
+          <p:cNvSpPr>
+            <a:spLocks noGrp="1"/>
+          </p:cNvSpPr>
+          <p:nvPr>
+            <p:ph type="sldNum" sz="quarter" idx="12"/>
+          </p:nvPr>
+        </p:nvSpPr>
+        <p:spPr/>
+        <p:txBody>
+          <a:bodyPr/>
+          <a:lstStyle/>
+          <a:p>
+            <a:fld id="{3AE964CF-DFDF-4B9D-8AE5-9B4D54DD768C}" type="slidenum">
+              <a:rPr lang="en-US" smtClean="0"/>
+              <a:t>11</a:t>
+            </a:fld>
+            <a:endParaRPr lang="en-US" dirty="0"/>
+          </a:p>
+        </p:txBody>
+      </p:sp>
+      <p:pic>
+        <p:nvPicPr>
+          <p:cNvPr id="7" name="Picture 6"/>
+          <p:cNvPicPr>
+            <a:picLocks noChangeAspect="1"/>
+          </p:cNvPicPr>
+          <p:nvPr/>
+        </p:nvPicPr>
+        <p:blipFill>
+          <a:blip r:embed="rId2"/>
+          <a:stretch>
+            <a:fillRect/>
+          </a:stretch>
+        </p:blipFill>
+        <p:spPr>
+          <a:xfrm>
+            <a:off x="4579397" y="1636050"/>
+            <a:ext cx="9854318" cy="4405312"/>
+          </a:xfrm>
+          <a:prstGeom prst="rect">
+            <a:avLst/>
+          </a:prstGeom>
+        </p:spPr>
+      </p:pic>
+    </p:spTree>
+    <p:extLst>
+      <p:ext uri="{BB962C8B-B14F-4D97-AF65-F5344CB8AC3E}">
+        <p14:creationId xmlns:p14="http://schemas.microsoft.com/office/powerpoint/2010/main" val="3685970426"/>
+      </p:ext>
+    </p:extLst>
+  </p:cSld>
+  <p:clrMapOvr>
+    <a:masterClrMapping/>
+  </p:clrMapOvr>
+</p:sld>
+</file>
+
+<file path=ppt/slides/slide12.xml><?xml version="1.0" encoding="utf-8"?>
+<p:sld xmlns:a="http://schemas.openxmlformats.org/drawingml/2006/main" xmlns:r="http://schemas.openxmlformats.org/officeDocument/2006/relationships" xmlns:p="http://schemas.openxmlformats.org/presentationml/2006/main">
+  <p:cSld>
+    <p:spTree>
+      <p:nvGrpSpPr>
+        <p:cNvPr id="1" name=""/>
+        <p:cNvGrpSpPr/>
+        <p:nvPr/>
+      </p:nvGrpSpPr>
+      <p:grpSpPr>
+        <a:xfrm>
+          <a:off x="0" y="0"/>
+          <a:ext cx="0" cy="0"/>
+          <a:chOff x="0" y="0"/>
+          <a:chExt cx="0" cy="0"/>
+        </a:xfrm>
+      </p:grpSpPr>
+      <p:sp>
+        <p:nvSpPr>
+          <p:cNvPr id="2" name="Title 1"/>
+          <p:cNvSpPr>
+            <a:spLocks noGrp="1"/>
+          </p:cNvSpPr>
+          <p:nvPr>
+            <p:ph type="title"/>
+          </p:nvPr>
+        </p:nvSpPr>
+        <p:spPr/>
+        <p:txBody>
+          <a:bodyPr/>
+          <a:lstStyle/>
+          <a:p>
+            <a:r>
+              <a:rPr lang="en-US" dirty="0"/>
               <a:t>DNU – Publish App</a:t>
             </a:r>
           </a:p>
@@ -21903,7 +22433,7 @@
           <a:p>
             <a:fld id="{3AE964CF-DFDF-4B9D-8AE5-9B4D54DD768C}" type="slidenum">
               <a:rPr lang="en-US" smtClean="0"/>
-              <a:t>11</a:t>
+              <a:t>12</a:t>
             </a:fld>
             <a:endParaRPr lang="en-US" dirty="0"/>
           </a:p>
@@ -22176,7 +22706,7 @@
 </p:sld>
 </file>
 
-<file path=ppt/slides/slide12.xml><?xml version="1.0" encoding="utf-8"?>
+<file path=ppt/slides/slide13.xml><?xml version="1.0" encoding="utf-8"?>
 <p:sld xmlns:a="http://schemas.openxmlformats.org/drawingml/2006/main" xmlns:r="http://schemas.openxmlformats.org/officeDocument/2006/relationships" xmlns:p="http://schemas.openxmlformats.org/presentationml/2006/main">
   <p:cSld>
     <p:spTree>
@@ -22258,7 +22788,7 @@
           <a:p>
             <a:fld id="{3AE964CF-DFDF-4B9D-8AE5-9B4D54DD768C}" type="slidenum">
               <a:rPr lang="en-US" smtClean="0"/>
-              <a:t>12</a:t>
+              <a:t>13</a:t>
             </a:fld>
             <a:endParaRPr lang="en-US" dirty="0"/>
           </a:p>
@@ -22608,7 +23138,7 @@
 </p:sld>
 </file>
 
-<file path=ppt/slides/slide13.xml><?xml version="1.0" encoding="utf-8"?>
+<file path=ppt/slides/slide14.xml><?xml version="1.0" encoding="utf-8"?>
 <p:sld xmlns:a="http://schemas.openxmlformats.org/drawingml/2006/main" xmlns:r="http://schemas.openxmlformats.org/officeDocument/2006/relationships" xmlns:p="http://schemas.openxmlformats.org/presentationml/2006/main">
   <p:cSld>
     <p:spTree>
@@ -22688,7 +23218,7 @@
           <a:p>
             <a:fld id="{3AE964CF-DFDF-4B9D-8AE5-9B4D54DD768C}" type="slidenum">
               <a:rPr lang="en-US" smtClean="0"/>
-              <a:t>13</a:t>
+              <a:t>14</a:t>
             </a:fld>
             <a:endParaRPr lang="en-US" dirty="0"/>
           </a:p>
@@ -23119,7 +23649,7 @@
 </p:sld>
 </file>
 
-<file path=ppt/slides/slide14.xml><?xml version="1.0" encoding="utf-8"?>
+<file path=ppt/slides/slide15.xml><?xml version="1.0" encoding="utf-8"?>
 <p:sld xmlns:a="http://schemas.openxmlformats.org/drawingml/2006/main" xmlns:r="http://schemas.openxmlformats.org/officeDocument/2006/relationships" xmlns:p="http://schemas.openxmlformats.org/presentationml/2006/main">
   <p:cSld>
     <p:spTree>
@@ -23197,7 +23727,7 @@
           <a:p>
             <a:fld id="{3AE964CF-DFDF-4B9D-8AE5-9B4D54DD768C}" type="slidenum">
               <a:rPr lang="en-US" smtClean="0"/>
-              <a:t>14</a:t>
+              <a:t>15</a:t>
             </a:fld>
             <a:endParaRPr lang="en-US" dirty="0"/>
           </a:p>
@@ -23305,7 +23835,7 @@
 </p:sld>
 </file>
 
-<file path=ppt/slides/slide15.xml><?xml version="1.0" encoding="utf-8"?>
+<file path=ppt/slides/slide16.xml><?xml version="1.0" encoding="utf-8"?>
 <p:sld xmlns:a="http://schemas.openxmlformats.org/drawingml/2006/main" xmlns:r="http://schemas.openxmlformats.org/officeDocument/2006/relationships" xmlns:p="http://schemas.openxmlformats.org/presentationml/2006/main">
   <p:cSld>
     <p:spTree>
@@ -23385,7 +23915,7 @@
           <a:p>
             <a:fld id="{3AE964CF-DFDF-4B9D-8AE5-9B4D54DD768C}" type="slidenum">
               <a:rPr lang="en-US" smtClean="0"/>
-              <a:t>15</a:t>
+              <a:t>16</a:t>
             </a:fld>
             <a:endParaRPr lang="en-US" dirty="0"/>
           </a:p>
@@ -23404,7 +23934,7 @@
 </p:sld>
 </file>
 
-<file path=ppt/slides/slide16.xml><?xml version="1.0" encoding="utf-8"?>
+<file path=ppt/slides/slide17.xml><?xml version="1.0" encoding="utf-8"?>
 <p:sld xmlns:a="http://schemas.openxmlformats.org/drawingml/2006/main" xmlns:r="http://schemas.openxmlformats.org/officeDocument/2006/relationships" xmlns:p="http://schemas.openxmlformats.org/presentationml/2006/main">
   <p:cSld>
     <p:spTree>
@@ -23438,7 +23968,7 @@
           <a:p>
             <a:fld id="{3AE964CF-DFDF-4B9D-8AE5-9B4D54DD768C}" type="slidenum">
               <a:rPr lang="en-US" smtClean="0"/>
-              <a:t>16</a:t>
+              <a:t>17</a:t>
             </a:fld>
             <a:endParaRPr lang="en-US" dirty="0"/>
           </a:p>
@@ -23514,7 +24044,7 @@
 </p:sld>
 </file>
 
-<file path=ppt/slides/slide17.xml><?xml version="1.0" encoding="utf-8"?>
+<file path=ppt/slides/slide18.xml><?xml version="1.0" encoding="utf-8"?>
 <p:sld xmlns:a="http://schemas.openxmlformats.org/drawingml/2006/main" xmlns:r="http://schemas.openxmlformats.org/officeDocument/2006/relationships" xmlns:p="http://schemas.openxmlformats.org/presentationml/2006/main">
   <p:cSld>
     <p:spTree>
@@ -23594,7 +24124,7 @@
           <a:p>
             <a:fld id="{3AE964CF-DFDF-4B9D-8AE5-9B4D54DD768C}" type="slidenum">
               <a:rPr lang="en-US" smtClean="0"/>
-              <a:t>17</a:t>
+              <a:t>18</a:t>
             </a:fld>
             <a:endParaRPr lang="en-US" dirty="0"/>
           </a:p>
@@ -23613,7 +24143,7 @@
 </p:sld>
 </file>
 
-<file path=ppt/slides/slide18.xml><?xml version="1.0" encoding="utf-8"?>
+<file path=ppt/slides/slide19.xml><?xml version="1.0" encoding="utf-8"?>
 <p:sld xmlns:a="http://schemas.openxmlformats.org/drawingml/2006/main" xmlns:r="http://schemas.openxmlformats.org/officeDocument/2006/relationships" xmlns:p="http://schemas.openxmlformats.org/presentationml/2006/main">
   <p:cSld>
     <p:spTree>
@@ -23647,7 +24177,7 @@
           <a:p>
             <a:fld id="{3AE964CF-DFDF-4B9D-8AE5-9B4D54DD768C}" type="slidenum">
               <a:rPr lang="en-US" smtClean="0"/>
-              <a:t>18</a:t>
+              <a:t>19</a:t>
             </a:fld>
             <a:endParaRPr lang="en-US" dirty="0"/>
           </a:p>
@@ -23687,181 +24217,6 @@
     <p:extLst>
       <p:ext uri="{BB962C8B-B14F-4D97-AF65-F5344CB8AC3E}">
         <p14:creationId xmlns:p14="http://schemas.microsoft.com/office/powerpoint/2010/main" val="1376088787"/>
-      </p:ext>
-    </p:extLst>
-  </p:cSld>
-  <p:clrMapOvr>
-    <a:masterClrMapping/>
-  </p:clrMapOvr>
-</p:sld>
-</file>
-
-<file path=ppt/slides/slide19.xml><?xml version="1.0" encoding="utf-8"?>
-<p:sld xmlns:a="http://schemas.openxmlformats.org/drawingml/2006/main" xmlns:r="http://schemas.openxmlformats.org/officeDocument/2006/relationships" xmlns:p="http://schemas.openxmlformats.org/presentationml/2006/main">
-  <p:cSld>
-    <p:spTree>
-      <p:nvGrpSpPr>
-        <p:cNvPr id="1" name=""/>
-        <p:cNvGrpSpPr/>
-        <p:nvPr/>
-      </p:nvGrpSpPr>
-      <p:grpSpPr>
-        <a:xfrm>
-          <a:off x="0" y="0"/>
-          <a:ext cx="0" cy="0"/>
-          <a:chOff x="0" y="0"/>
-          <a:chExt cx="0" cy="0"/>
-        </a:xfrm>
-      </p:grpSpPr>
-      <p:sp>
-        <p:nvSpPr>
-          <p:cNvPr id="5" name="Title 4"/>
-          <p:cNvSpPr>
-            <a:spLocks noGrp="1"/>
-          </p:cNvSpPr>
-          <p:nvPr>
-            <p:ph type="title"/>
-          </p:nvPr>
-        </p:nvSpPr>
-        <p:spPr/>
-        <p:txBody>
-          <a:bodyPr/>
-          <a:lstStyle/>
-          <a:p>
-            <a:r>
-              <a:rPr lang="en-US" b="1" dirty="0">
-                <a:latin typeface="Consolas" panose="020B0609020204030204" pitchFamily="49" charset="0"/>
-                <a:cs typeface="Consolas" panose="020B0609020204030204" pitchFamily="49" charset="0"/>
-              </a:rPr>
-              <a:t>&gt;</a:t>
-            </a:r>
-            <a:r>
-              <a:rPr lang="en-US" dirty="0">
-                <a:latin typeface="Consolas" panose="020B0609020204030204" pitchFamily="49" charset="0"/>
-                <a:cs typeface="Consolas" panose="020B0609020204030204" pitchFamily="49" charset="0"/>
-              </a:rPr>
-              <a:t> DN* Demo</a:t>
-            </a:r>
-            <a:r>
-              <a:rPr lang="en-US" dirty="0"/>
-              <a:t> </a:t>
-            </a:r>
-          </a:p>
-        </p:txBody>
-      </p:sp>
-      <p:sp>
-        <p:nvSpPr>
-          <p:cNvPr id="6" name="Text Placeholder 5"/>
-          <p:cNvSpPr>
-            <a:spLocks noGrp="1"/>
-          </p:cNvSpPr>
-          <p:nvPr>
-            <p:ph type="body" idx="1"/>
-          </p:nvPr>
-        </p:nvSpPr>
-        <p:spPr/>
-        <p:txBody>
-          <a:bodyPr/>
-          <a:lstStyle/>
-          <a:p>
-            <a:r>
-              <a:rPr lang="en-US"/>
-              <a:t>ASP.NET 5 </a:t>
-            </a:r>
-            <a:r>
-              <a:rPr lang="en-US" dirty="0"/>
-              <a:t>Web Application in VS Code</a:t>
-            </a:r>
-          </a:p>
-        </p:txBody>
-      </p:sp>
-      <p:sp>
-        <p:nvSpPr>
-          <p:cNvPr id="4" name="Slide Number Placeholder 3"/>
-          <p:cNvSpPr>
-            <a:spLocks noGrp="1"/>
-          </p:cNvSpPr>
-          <p:nvPr>
-            <p:ph type="sldNum" sz="quarter" idx="12"/>
-          </p:nvPr>
-        </p:nvSpPr>
-        <p:spPr/>
-        <p:txBody>
-          <a:bodyPr/>
-          <a:lstStyle/>
-          <a:p>
-            <a:fld id="{3AE964CF-DFDF-4B9D-8AE5-9B4D54DD768C}" type="slidenum">
-              <a:rPr lang="en-US" smtClean="0"/>
-              <a:t>19</a:t>
-            </a:fld>
-            <a:endParaRPr lang="en-US" dirty="0"/>
-          </a:p>
-        </p:txBody>
-      </p:sp>
-      <p:pic>
-        <p:nvPicPr>
-          <p:cNvPr id="7" name="Picture 6"/>
-          <p:cNvPicPr>
-            <a:picLocks noChangeAspect="1"/>
-          </p:cNvPicPr>
-          <p:nvPr/>
-        </p:nvPicPr>
-        <p:blipFill>
-          <a:blip r:embed="rId2">
-            <a:extLst>
-              <a:ext uri="{28A0092B-C50C-407E-A947-70E740481C1C}">
-                <a14:useLocalDpi xmlns:a14="http://schemas.microsoft.com/office/drawing/2010/main" val="0"/>
-              </a:ext>
-            </a:extLst>
-          </a:blip>
-          <a:stretch>
-            <a:fillRect/>
-          </a:stretch>
-        </p:blipFill>
-        <p:spPr>
-          <a:xfrm>
-            <a:off x="817602" y="5091020"/>
-            <a:ext cx="950342" cy="950342"/>
-          </a:xfrm>
-          <a:prstGeom prst="rect">
-            <a:avLst/>
-          </a:prstGeom>
-        </p:spPr>
-      </p:pic>
-      <p:pic>
-        <p:nvPicPr>
-          <p:cNvPr id="8" name="Picture 7"/>
-          <p:cNvPicPr>
-            <a:picLocks noChangeAspect="1"/>
-          </p:cNvPicPr>
-          <p:nvPr/>
-        </p:nvPicPr>
-        <p:blipFill>
-          <a:blip r:embed="rId3" cstate="print">
-            <a:extLst>
-              <a:ext uri="{28A0092B-C50C-407E-A947-70E740481C1C}">
-                <a14:useLocalDpi xmlns:a14="http://schemas.microsoft.com/office/drawing/2010/main" val="0"/>
-              </a:ext>
-            </a:extLst>
-          </a:blip>
-          <a:stretch>
-            <a:fillRect/>
-          </a:stretch>
-        </p:blipFill>
-        <p:spPr>
-          <a:xfrm>
-            <a:off x="3456602" y="3873934"/>
-            <a:ext cx="568024" cy="568024"/>
-          </a:xfrm>
-          <a:prstGeom prst="rect">
-            <a:avLst/>
-          </a:prstGeom>
-        </p:spPr>
-      </p:pic>
-    </p:spTree>
-    <p:extLst>
-      <p:ext uri="{BB962C8B-B14F-4D97-AF65-F5344CB8AC3E}">
-        <p14:creationId xmlns:p14="http://schemas.microsoft.com/office/powerpoint/2010/main" val="2748897786"/>
       </p:ext>
     </p:extLst>
   </p:cSld>
@@ -24045,10 +24400,188 @@
   <p:clrMapOvr>
     <a:masterClrMapping/>
   </p:clrMapOvr>
+  <p:transition spd="med" advTm="8000">
+    <p:pull/>
+  </p:transition>
 </p:sld>
 </file>
 
 <file path=ppt/slides/slide20.xml><?xml version="1.0" encoding="utf-8"?>
+<p:sld xmlns:a="http://schemas.openxmlformats.org/drawingml/2006/main" xmlns:r="http://schemas.openxmlformats.org/officeDocument/2006/relationships" xmlns:p="http://schemas.openxmlformats.org/presentationml/2006/main">
+  <p:cSld>
+    <p:spTree>
+      <p:nvGrpSpPr>
+        <p:cNvPr id="1" name=""/>
+        <p:cNvGrpSpPr/>
+        <p:nvPr/>
+      </p:nvGrpSpPr>
+      <p:grpSpPr>
+        <a:xfrm>
+          <a:off x="0" y="0"/>
+          <a:ext cx="0" cy="0"/>
+          <a:chOff x="0" y="0"/>
+          <a:chExt cx="0" cy="0"/>
+        </a:xfrm>
+      </p:grpSpPr>
+      <p:sp>
+        <p:nvSpPr>
+          <p:cNvPr id="5" name="Title 4"/>
+          <p:cNvSpPr>
+            <a:spLocks noGrp="1"/>
+          </p:cNvSpPr>
+          <p:nvPr>
+            <p:ph type="title"/>
+          </p:nvPr>
+        </p:nvSpPr>
+        <p:spPr/>
+        <p:txBody>
+          <a:bodyPr/>
+          <a:lstStyle/>
+          <a:p>
+            <a:r>
+              <a:rPr lang="en-US" b="1" dirty="0">
+                <a:latin typeface="Consolas" panose="020B0609020204030204" pitchFamily="49" charset="0"/>
+                <a:cs typeface="Consolas" panose="020B0609020204030204" pitchFamily="49" charset="0"/>
+              </a:rPr>
+              <a:t>&gt;</a:t>
+            </a:r>
+            <a:r>
+              <a:rPr lang="en-US" dirty="0">
+                <a:latin typeface="Consolas" panose="020B0609020204030204" pitchFamily="49" charset="0"/>
+                <a:cs typeface="Consolas" panose="020B0609020204030204" pitchFamily="49" charset="0"/>
+              </a:rPr>
+              <a:t> DN* Demo</a:t>
+            </a:r>
+            <a:r>
+              <a:rPr lang="en-US" dirty="0"/>
+              <a:t> </a:t>
+            </a:r>
+          </a:p>
+        </p:txBody>
+      </p:sp>
+      <p:sp>
+        <p:nvSpPr>
+          <p:cNvPr id="6" name="Text Placeholder 5"/>
+          <p:cNvSpPr>
+            <a:spLocks noGrp="1"/>
+          </p:cNvSpPr>
+          <p:nvPr>
+            <p:ph type="body" idx="1"/>
+          </p:nvPr>
+        </p:nvSpPr>
+        <p:spPr/>
+        <p:txBody>
+          <a:bodyPr/>
+          <a:lstStyle/>
+          <a:p>
+            <a:r>
+              <a:rPr lang="en-US"/>
+              <a:t>ASP.NET 5 </a:t>
+            </a:r>
+            <a:r>
+              <a:rPr lang="en-US" dirty="0"/>
+              <a:t>Web Application in VS Code</a:t>
+            </a:r>
+          </a:p>
+        </p:txBody>
+      </p:sp>
+      <p:sp>
+        <p:nvSpPr>
+          <p:cNvPr id="4" name="Slide Number Placeholder 3"/>
+          <p:cNvSpPr>
+            <a:spLocks noGrp="1"/>
+          </p:cNvSpPr>
+          <p:nvPr>
+            <p:ph type="sldNum" sz="quarter" idx="12"/>
+          </p:nvPr>
+        </p:nvSpPr>
+        <p:spPr/>
+        <p:txBody>
+          <a:bodyPr/>
+          <a:lstStyle/>
+          <a:p>
+            <a:fld id="{3AE964CF-DFDF-4B9D-8AE5-9B4D54DD768C}" type="slidenum">
+              <a:rPr lang="en-US" smtClean="0"/>
+              <a:t>20</a:t>
+            </a:fld>
+            <a:endParaRPr lang="en-US" dirty="0"/>
+          </a:p>
+        </p:txBody>
+      </p:sp>
+      <p:pic>
+        <p:nvPicPr>
+          <p:cNvPr id="7" name="Picture 6"/>
+          <p:cNvPicPr>
+            <a:picLocks noChangeAspect="1"/>
+          </p:cNvPicPr>
+          <p:nvPr/>
+        </p:nvPicPr>
+        <p:blipFill>
+          <a:blip r:embed="rId2">
+            <a:extLst>
+              <a:ext uri="{28A0092B-C50C-407E-A947-70E740481C1C}">
+                <a14:useLocalDpi xmlns:a14="http://schemas.microsoft.com/office/drawing/2010/main" val="0"/>
+              </a:ext>
+            </a:extLst>
+          </a:blip>
+          <a:stretch>
+            <a:fillRect/>
+          </a:stretch>
+        </p:blipFill>
+        <p:spPr>
+          <a:xfrm>
+            <a:off x="817602" y="5091020"/>
+            <a:ext cx="950342" cy="950342"/>
+          </a:xfrm>
+          <a:prstGeom prst="rect">
+            <a:avLst/>
+          </a:prstGeom>
+        </p:spPr>
+      </p:pic>
+      <p:pic>
+        <p:nvPicPr>
+          <p:cNvPr id="8" name="Picture 7"/>
+          <p:cNvPicPr>
+            <a:picLocks noChangeAspect="1"/>
+          </p:cNvPicPr>
+          <p:nvPr/>
+        </p:nvPicPr>
+        <p:blipFill>
+          <a:blip r:embed="rId3" cstate="print">
+            <a:extLst>
+              <a:ext uri="{28A0092B-C50C-407E-A947-70E740481C1C}">
+                <a14:useLocalDpi xmlns:a14="http://schemas.microsoft.com/office/drawing/2010/main" val="0"/>
+              </a:ext>
+            </a:extLst>
+          </a:blip>
+          <a:stretch>
+            <a:fillRect/>
+          </a:stretch>
+        </p:blipFill>
+        <p:spPr>
+          <a:xfrm>
+            <a:off x="3456602" y="3873934"/>
+            <a:ext cx="568024" cy="568024"/>
+          </a:xfrm>
+          <a:prstGeom prst="rect">
+            <a:avLst/>
+          </a:prstGeom>
+        </p:spPr>
+      </p:pic>
+    </p:spTree>
+    <p:extLst>
+      <p:ext uri="{BB962C8B-B14F-4D97-AF65-F5344CB8AC3E}">
+        <p14:creationId xmlns:p14="http://schemas.microsoft.com/office/powerpoint/2010/main" val="2748897786"/>
+      </p:ext>
+    </p:extLst>
+  </p:cSld>
+  <p:clrMapOvr>
+    <a:masterClrMapping/>
+  </p:clrMapOvr>
+</p:sld>
+</file>
+
+<file path=ppt/slides/slide21.xml><?xml version="1.0" encoding="utf-8"?>
 <p:sld xmlns:a="http://schemas.openxmlformats.org/drawingml/2006/main" xmlns:r="http://schemas.openxmlformats.org/officeDocument/2006/relationships" xmlns:p="http://schemas.openxmlformats.org/presentationml/2006/main">
   <p:cSld>
     <p:spTree>
@@ -24128,7 +24661,7 @@
           <a:p>
             <a:fld id="{3AE964CF-DFDF-4B9D-8AE5-9B4D54DD768C}" type="slidenum">
               <a:rPr lang="en-US" smtClean="0"/>
-              <a:t>20</a:t>
+              <a:t>21</a:t>
             </a:fld>
             <a:endParaRPr lang="en-US" dirty="0"/>
           </a:p>
@@ -24169,7 +24702,7 @@
 </p:sld>
 </file>
 
-<file path=ppt/slides/slide21.xml><?xml version="1.0" encoding="utf-8"?>
+<file path=ppt/slides/slide22.xml><?xml version="1.0" encoding="utf-8"?>
 <p:sld xmlns:a="http://schemas.openxmlformats.org/drawingml/2006/main" xmlns:r="http://schemas.openxmlformats.org/officeDocument/2006/relationships" xmlns:p="http://schemas.openxmlformats.org/presentationml/2006/main">
   <p:cSld>
     <p:spTree>
@@ -24253,7 +24786,7 @@
           <a:p>
             <a:fld id="{3AE964CF-DFDF-4B9D-8AE5-9B4D54DD768C}" type="slidenum">
               <a:rPr lang="en-US" smtClean="0"/>
-              <a:t>21</a:t>
+              <a:t>22</a:t>
             </a:fld>
             <a:endParaRPr lang="en-US" dirty="0"/>
           </a:p>
@@ -24324,7 +24857,7 @@
 </p:sld>
 </file>
 
-<file path=ppt/slides/slide22.xml><?xml version="1.0" encoding="utf-8"?>
+<file path=ppt/slides/slide23.xml><?xml version="1.0" encoding="utf-8"?>
 <p:sld xmlns:a="http://schemas.openxmlformats.org/drawingml/2006/main" xmlns:r="http://schemas.openxmlformats.org/officeDocument/2006/relationships" xmlns:p="http://schemas.openxmlformats.org/presentationml/2006/main">
   <p:cSld>
     <p:spTree>
@@ -24809,7 +25342,7 @@
           <a:p>
             <a:fld id="{3AE964CF-DFDF-4B9D-8AE5-9B4D54DD768C}" type="slidenum">
               <a:rPr lang="en-US" smtClean="0"/>
-              <a:t>22</a:t>
+              <a:t>23</a:t>
             </a:fld>
             <a:endParaRPr lang="en-US" dirty="0"/>
           </a:p>
@@ -24828,7 +25361,7 @@
 </p:sld>
 </file>
 
-<file path=ppt/slides/slide23.xml><?xml version="1.0" encoding="utf-8"?>
+<file path=ppt/slides/slide24.xml><?xml version="1.0" encoding="utf-8"?>
 <p:sld xmlns:a="http://schemas.openxmlformats.org/drawingml/2006/main" xmlns:r="http://schemas.openxmlformats.org/officeDocument/2006/relationships" xmlns:p="http://schemas.openxmlformats.org/presentationml/2006/main">
   <p:cSld>
     <p:spTree>
@@ -24934,7 +25467,7 @@
           <a:p>
             <a:fld id="{3AE964CF-DFDF-4B9D-8AE5-9B4D54DD768C}" type="slidenum">
               <a:rPr lang="en-US" smtClean="0"/>
-              <a:t>23</a:t>
+              <a:t>24</a:t>
             </a:fld>
             <a:endParaRPr lang="en-US" dirty="0"/>
           </a:p>
@@ -25013,7 +25546,7 @@
 </p:sld>
 </file>
 
-<file path=ppt/slides/slide24.xml><?xml version="1.0" encoding="utf-8"?>
+<file path=ppt/slides/slide25.xml><?xml version="1.0" encoding="utf-8"?>
 <p:sld xmlns:a="http://schemas.openxmlformats.org/drawingml/2006/main" xmlns:r="http://schemas.openxmlformats.org/officeDocument/2006/relationships" xmlns:p="http://schemas.openxmlformats.org/presentationml/2006/main">
   <p:cSld>
     <p:spTree>
@@ -25145,7 +25678,7 @@
           <a:p>
             <a:fld id="{3AE964CF-DFDF-4B9D-8AE5-9B4D54DD768C}" type="slidenum">
               <a:rPr lang="en-US" smtClean="0"/>
-              <a:t>24</a:t>
+              <a:t>25</a:t>
             </a:fld>
             <a:endParaRPr lang="en-US" dirty="0"/>
           </a:p>
@@ -25164,7 +25697,7 @@
 </p:sld>
 </file>
 
-<file path=ppt/slides/slide25.xml><?xml version="1.0" encoding="utf-8"?>
+<file path=ppt/slides/slide26.xml><?xml version="1.0" encoding="utf-8"?>
 <p:sld xmlns:a="http://schemas.openxmlformats.org/drawingml/2006/main" xmlns:r="http://schemas.openxmlformats.org/officeDocument/2006/relationships" xmlns:p="http://schemas.openxmlformats.org/presentationml/2006/main">
   <p:cSld>
     <p:spTree>
@@ -25315,7 +25848,7 @@
           <a:p>
             <a:fld id="{3AE964CF-DFDF-4B9D-8AE5-9B4D54DD768C}" type="slidenum">
               <a:rPr lang="en-US" smtClean="0"/>
-              <a:t>25</a:t>
+              <a:t>26</a:t>
             </a:fld>
             <a:endParaRPr lang="en-US" dirty="0"/>
           </a:p>
@@ -25794,7 +26327,7 @@
             <a:spLocks noGrp="1"/>
           </p:cNvSpPr>
           <p:nvPr>
-            <p:ph type="title"/>
+            <p:ph type="ctrTitle"/>
           </p:nvPr>
         </p:nvSpPr>
         <p:spPr/>
@@ -25804,126 +26337,154 @@
           <a:p>
             <a:r>
               <a:rPr lang="en-US" dirty="0"/>
-              <a:t>New Terminology (&lt;= RC1)</a:t>
+              <a:t>Getting Started with ASP.NET Core in VS Code</a:t>
             </a:r>
           </a:p>
         </p:txBody>
       </p:sp>
       <p:sp>
         <p:nvSpPr>
-          <p:cNvPr id="5" name="Content Placeholder 4"/>
+          <p:cNvPr id="3" name="Subtitle 2"/>
           <p:cNvSpPr>
             <a:spLocks noGrp="1"/>
           </p:cNvSpPr>
           <p:nvPr>
-            <p:ph idx="1"/>
-          </p:nvPr>
-        </p:nvSpPr>
-        <p:spPr>
-          <a:xfrm>
-            <a:off x="677334" y="1607821"/>
-            <a:ext cx="8596668" cy="4433542"/>
-          </a:xfrm>
-        </p:spPr>
-        <p:txBody>
-          <a:bodyPr/>
-          <a:lstStyle/>
-          <a:p>
-            <a:r>
-              <a:rPr lang="en-US" sz="2000" b="1" dirty="0"/>
-              <a:t>DNVM</a:t>
-            </a:r>
-            <a:r>
-              <a:rPr lang="en-US" sz="2000" dirty="0"/>
-              <a:t> (.NET Version Manager)</a:t>
-            </a:r>
-          </a:p>
-          <a:p>
-            <a:r>
-              <a:rPr lang="en-US" sz="2000" b="1" dirty="0"/>
-              <a:t>DNX</a:t>
-            </a:r>
-            <a:r>
-              <a:rPr lang="en-US" sz="2000" dirty="0"/>
-              <a:t> (.NET Execution Environment)</a:t>
-            </a:r>
-          </a:p>
-          <a:p>
-            <a:r>
-              <a:rPr lang="en-US" sz="2000" b="1" dirty="0"/>
-              <a:t>DNU</a:t>
-            </a:r>
-            <a:r>
-              <a:rPr lang="en-US" sz="2000" dirty="0"/>
-              <a:t> (.NET Development Utility)</a:t>
-            </a:r>
-          </a:p>
-          <a:p>
-            <a:pPr marL="0" indent="0">
-              <a:buNone/>
-            </a:pPr>
-            <a:endParaRPr lang="en-US" sz="2000" dirty="0"/>
-          </a:p>
-          <a:p>
-            <a:endParaRPr lang="en-US" sz="2000" dirty="0"/>
-          </a:p>
-          <a:p>
-            <a:r>
-              <a:rPr lang="en-US" sz="2000" dirty="0"/>
-              <a:t>Installation of DN* Tooling:</a:t>
-            </a:r>
-          </a:p>
-          <a:p>
-            <a:pPr lvl="1"/>
-            <a:r>
-              <a:rPr lang="en-US" sz="1800" dirty="0">
-                <a:hlinkClick r:id="rId2"/>
-              </a:rPr>
-              <a:t>https://get.asp.net/</a:t>
-            </a:r>
-            <a:endParaRPr lang="en-US" sz="1800" dirty="0"/>
-          </a:p>
-          <a:p>
-            <a:pPr marL="0" indent="0">
-              <a:buNone/>
-            </a:pPr>
-            <a:endParaRPr lang="en-US" dirty="0"/>
-          </a:p>
-        </p:txBody>
-      </p:sp>
-      <p:sp>
-        <p:nvSpPr>
-          <p:cNvPr id="6" name="Slide Number Placeholder 5"/>
-          <p:cNvSpPr>
-            <a:spLocks noGrp="1"/>
-          </p:cNvSpPr>
-          <p:nvPr>
-            <p:ph type="sldNum" sz="quarter" idx="12"/>
+            <p:ph type="subTitle" idx="1"/>
           </p:nvPr>
         </p:nvSpPr>
         <p:spPr/>
         <p:txBody>
-          <a:bodyPr/>
+          <a:bodyPr>
+            <a:normAutofit/>
+          </a:bodyPr>
           <a:lstStyle/>
           <a:p>
-            <a:fld id="{3AE964CF-DFDF-4B9D-8AE5-9B4D54DD768C}" type="slidenum">
-              <a:rPr lang="en-US" smtClean="0"/>
-              <a:t>3</a:t>
-            </a:fld>
-            <a:endParaRPr lang="en-US" dirty="0"/>
+            <a:r>
+              <a:rPr lang="en-US" sz="2000" dirty="0"/>
+              <a:t>@Scott_Addie</a:t>
+            </a:r>
           </a:p>
         </p:txBody>
       </p:sp>
+      <p:pic>
+        <p:nvPicPr>
+          <p:cNvPr id="5" name="Picture 4"/>
+          <p:cNvPicPr>
+            <a:picLocks noChangeAspect="1"/>
+          </p:cNvPicPr>
+          <p:nvPr/>
+        </p:nvPicPr>
+        <p:blipFill>
+          <a:blip r:embed="rId3">
+            <a:extLst>
+              <a:ext uri="{28A0092B-C50C-407E-A947-70E740481C1C}">
+                <a14:useLocalDpi xmlns:a14="http://schemas.microsoft.com/office/drawing/2010/main" val="0"/>
+              </a:ext>
+            </a:extLst>
+          </a:blip>
+          <a:stretch>
+            <a:fillRect/>
+          </a:stretch>
+        </p:blipFill>
+        <p:spPr>
+          <a:xfrm>
+            <a:off x="7511907" y="584540"/>
+            <a:ext cx="1762096" cy="1762096"/>
+          </a:xfrm>
+          <a:prstGeom prst="rect">
+            <a:avLst/>
+          </a:prstGeom>
+        </p:spPr>
+      </p:pic>
+      <p:pic>
+        <p:nvPicPr>
+          <p:cNvPr id="6" name="Picture 5"/>
+          <p:cNvPicPr>
+            <a:picLocks noChangeAspect="1"/>
+          </p:cNvPicPr>
+          <p:nvPr/>
+        </p:nvPicPr>
+        <p:blipFill>
+          <a:blip r:embed="rId4" cstate="print">
+            <a:extLst>
+              <a:ext uri="{28A0092B-C50C-407E-A947-70E740481C1C}">
+                <a14:useLocalDpi xmlns:a14="http://schemas.microsoft.com/office/drawing/2010/main" val="0"/>
+              </a:ext>
+            </a:extLst>
+          </a:blip>
+          <a:stretch>
+            <a:fillRect/>
+          </a:stretch>
+        </p:blipFill>
+        <p:spPr>
+          <a:xfrm>
+            <a:off x="7067924" y="4108734"/>
+            <a:ext cx="443983" cy="360956"/>
+          </a:xfrm>
+          <a:prstGeom prst="rect">
+            <a:avLst/>
+          </a:prstGeom>
+        </p:spPr>
+      </p:pic>
+      <p:pic>
+        <p:nvPicPr>
+          <p:cNvPr id="1026" name="Picture 2" descr="http://news.fujixerox.com/compo/eng/news/2013/000853/images/01.jpg"/>
+          <p:cNvPicPr>
+            <a:picLocks noChangeAspect="1" noChangeArrowheads="1"/>
+          </p:cNvPicPr>
+          <p:nvPr/>
+        </p:nvPicPr>
+        <p:blipFill>
+          <a:blip r:embed="rId5">
+            <a:extLst>
+              <a:ext uri="{28A0092B-C50C-407E-A947-70E740481C1C}">
+                <a14:useLocalDpi xmlns:a14="http://schemas.microsoft.com/office/drawing/2010/main" val="0"/>
+              </a:ext>
+            </a:extLst>
+          </a:blip>
+          <a:srcRect/>
+          <a:stretch>
+            <a:fillRect/>
+          </a:stretch>
+        </p:blipFill>
+        <p:spPr bwMode="auto">
+          <a:xfrm>
+            <a:off x="7797508" y="4599282"/>
+            <a:ext cx="1290219" cy="1161197"/>
+          </a:xfrm>
+          <a:prstGeom prst="rect">
+            <a:avLst/>
+          </a:prstGeom>
+          <a:noFill/>
+          <a:extLst>
+            <a:ext uri="{909E8E84-426E-40DD-AFC4-6F175D3DCCD1}">
+              <a14:hiddenFill xmlns:a14="http://schemas.microsoft.com/office/drawing/2010/main">
+                <a:solidFill>
+                  <a:srgbClr val="FFFFFF"/>
+                </a:solidFill>
+              </a14:hiddenFill>
+            </a:ext>
+          </a:extLst>
+        </p:spPr>
+      </p:pic>
     </p:spTree>
     <p:extLst>
       <p:ext uri="{BB962C8B-B14F-4D97-AF65-F5344CB8AC3E}">
-        <p14:creationId xmlns:p14="http://schemas.microsoft.com/office/powerpoint/2010/main" val="3301370015"/>
+        <p14:creationId xmlns:p14="http://schemas.microsoft.com/office/powerpoint/2010/main" val="2069371483"/>
       </p:ext>
     </p:extLst>
   </p:cSld>
   <p:clrMapOvr>
     <a:masterClrMapping/>
   </p:clrMapOvr>
+  <mc:AlternateContent xmlns:mc="http://schemas.openxmlformats.org/markup-compatibility/2006">
+    <mc:Choice xmlns:p14="http://schemas.microsoft.com/office/powerpoint/2010/main" Requires="p14">
+      <p:transition spd="slow" p14:dur="2000" advTm="8000"/>
+    </mc:Choice>
+    <mc:Fallback>
+      <p:transition spd="slow" advTm="8000"/>
+    </mc:Fallback>
+  </mc:AlternateContent>
 </p:sld>
 </file>
 
@@ -25961,6 +26522,163 @@
           <a:p>
             <a:r>
               <a:rPr lang="en-US" dirty="0"/>
+              <a:t>New Terminology (&lt;= RC1)</a:t>
+            </a:r>
+          </a:p>
+        </p:txBody>
+      </p:sp>
+      <p:sp>
+        <p:nvSpPr>
+          <p:cNvPr id="5" name="Content Placeholder 4"/>
+          <p:cNvSpPr>
+            <a:spLocks noGrp="1"/>
+          </p:cNvSpPr>
+          <p:nvPr>
+            <p:ph idx="1"/>
+          </p:nvPr>
+        </p:nvSpPr>
+        <p:spPr>
+          <a:xfrm>
+            <a:off x="677334" y="1607821"/>
+            <a:ext cx="8596668" cy="4433542"/>
+          </a:xfrm>
+        </p:spPr>
+        <p:txBody>
+          <a:bodyPr/>
+          <a:lstStyle/>
+          <a:p>
+            <a:r>
+              <a:rPr lang="en-US" sz="2000" b="1" dirty="0"/>
+              <a:t>DNVM</a:t>
+            </a:r>
+            <a:r>
+              <a:rPr lang="en-US" sz="2000" dirty="0"/>
+              <a:t> (.NET Version Manager)</a:t>
+            </a:r>
+          </a:p>
+          <a:p>
+            <a:r>
+              <a:rPr lang="en-US" sz="2000" b="1" dirty="0"/>
+              <a:t>DNX</a:t>
+            </a:r>
+            <a:r>
+              <a:rPr lang="en-US" sz="2000" dirty="0"/>
+              <a:t> (.NET Execution Environment)</a:t>
+            </a:r>
+          </a:p>
+          <a:p>
+            <a:r>
+              <a:rPr lang="en-US" sz="2000" b="1" dirty="0"/>
+              <a:t>DNU</a:t>
+            </a:r>
+            <a:r>
+              <a:rPr lang="en-US" sz="2000" dirty="0"/>
+              <a:t> (.NET Development Utility)</a:t>
+            </a:r>
+          </a:p>
+          <a:p>
+            <a:pPr marL="0" indent="0">
+              <a:buNone/>
+            </a:pPr>
+            <a:endParaRPr lang="en-US" sz="2000" dirty="0"/>
+          </a:p>
+          <a:p>
+            <a:endParaRPr lang="en-US" sz="2000" dirty="0"/>
+          </a:p>
+          <a:p>
+            <a:r>
+              <a:rPr lang="en-US" sz="2000" dirty="0"/>
+              <a:t>Installation of DN* Tooling:</a:t>
+            </a:r>
+          </a:p>
+          <a:p>
+            <a:pPr lvl="1"/>
+            <a:r>
+              <a:rPr lang="en-US" sz="1800" dirty="0">
+                <a:hlinkClick r:id="rId2"/>
+              </a:rPr>
+              <a:t>https://get.asp.net/</a:t>
+            </a:r>
+            <a:endParaRPr lang="en-US" sz="1800" dirty="0"/>
+          </a:p>
+          <a:p>
+            <a:pPr marL="0" indent="0">
+              <a:buNone/>
+            </a:pPr>
+            <a:endParaRPr lang="en-US" dirty="0"/>
+          </a:p>
+        </p:txBody>
+      </p:sp>
+      <p:sp>
+        <p:nvSpPr>
+          <p:cNvPr id="6" name="Slide Number Placeholder 5"/>
+          <p:cNvSpPr>
+            <a:spLocks noGrp="1"/>
+          </p:cNvSpPr>
+          <p:nvPr>
+            <p:ph type="sldNum" sz="quarter" idx="12"/>
+          </p:nvPr>
+        </p:nvSpPr>
+        <p:spPr/>
+        <p:txBody>
+          <a:bodyPr/>
+          <a:lstStyle/>
+          <a:p>
+            <a:fld id="{3AE964CF-DFDF-4B9D-8AE5-9B4D54DD768C}" type="slidenum">
+              <a:rPr lang="en-US" smtClean="0"/>
+              <a:t>4</a:t>
+            </a:fld>
+            <a:endParaRPr lang="en-US" dirty="0"/>
+          </a:p>
+        </p:txBody>
+      </p:sp>
+    </p:spTree>
+    <p:extLst>
+      <p:ext uri="{BB962C8B-B14F-4D97-AF65-F5344CB8AC3E}">
+        <p14:creationId xmlns:p14="http://schemas.microsoft.com/office/powerpoint/2010/main" val="3301370015"/>
+      </p:ext>
+    </p:extLst>
+  </p:cSld>
+  <p:clrMapOvr>
+    <a:masterClrMapping/>
+  </p:clrMapOvr>
+</p:sld>
+</file>
+
+<file path=ppt/slides/slide5.xml><?xml version="1.0" encoding="utf-8"?>
+<p:sld xmlns:a="http://schemas.openxmlformats.org/drawingml/2006/main" xmlns:r="http://schemas.openxmlformats.org/officeDocument/2006/relationships" xmlns:p="http://schemas.openxmlformats.org/presentationml/2006/main">
+  <p:cSld>
+    <p:spTree>
+      <p:nvGrpSpPr>
+        <p:cNvPr id="1" name=""/>
+        <p:cNvGrpSpPr/>
+        <p:nvPr/>
+      </p:nvGrpSpPr>
+      <p:grpSpPr>
+        <a:xfrm>
+          <a:off x="0" y="0"/>
+          <a:ext cx="0" cy="0"/>
+          <a:chOff x="0" y="0"/>
+          <a:chExt cx="0" cy="0"/>
+        </a:xfrm>
+      </p:grpSpPr>
+      <p:sp>
+        <p:nvSpPr>
+          <p:cNvPr id="2" name="Title 1"/>
+          <p:cNvSpPr>
+            <a:spLocks noGrp="1"/>
+          </p:cNvSpPr>
+          <p:nvPr>
+            <p:ph type="title"/>
+          </p:nvPr>
+        </p:nvSpPr>
+        <p:spPr/>
+        <p:txBody>
+          <a:bodyPr/>
+          <a:lstStyle/>
+          <a:p>
+            <a:r>
+              <a:rPr lang="en-US" dirty="0"/>
               <a:t>New Choices</a:t>
             </a:r>
           </a:p>
@@ -25983,7 +26701,7 @@
           <a:p>
             <a:fld id="{3AE964CF-DFDF-4B9D-8AE5-9B4D54DD768C}" type="slidenum">
               <a:rPr lang="en-US" smtClean="0"/>
-              <a:t>4</a:t>
+              <a:t>5</a:t>
             </a:fld>
             <a:endParaRPr lang="en-US" dirty="0"/>
           </a:p>
@@ -26606,7 +27324,7 @@
 </p:sld>
 </file>
 
-<file path=ppt/slides/slide5.xml><?xml version="1.0" encoding="utf-8"?>
+<file path=ppt/slides/slide6.xml><?xml version="1.0" encoding="utf-8"?>
 <p:sld xmlns:a="http://schemas.openxmlformats.org/drawingml/2006/main" xmlns:r="http://schemas.openxmlformats.org/officeDocument/2006/relationships" xmlns:p="http://schemas.openxmlformats.org/presentationml/2006/main">
   <p:cSld>
     <p:spTree>
@@ -26794,7 +27512,7 @@
           <a:p>
             <a:fld id="{3AE964CF-DFDF-4B9D-8AE5-9B4D54DD768C}" type="slidenum">
               <a:rPr lang="en-US" smtClean="0"/>
-              <a:t>5</a:t>
+              <a:t>6</a:t>
             </a:fld>
             <a:endParaRPr lang="en-US" dirty="0"/>
           </a:p>
@@ -26878,7 +27596,7 @@
 </p:sld>
 </file>
 
-<file path=ppt/slides/slide6.xml><?xml version="1.0" encoding="utf-8"?>
+<file path=ppt/slides/slide7.xml><?xml version="1.0" encoding="utf-8"?>
 <p:sld xmlns:a="http://schemas.openxmlformats.org/drawingml/2006/main" xmlns:r="http://schemas.openxmlformats.org/officeDocument/2006/relationships" xmlns:p="http://schemas.openxmlformats.org/presentationml/2006/main">
   <p:cSld>
     <p:spTree>
@@ -26967,7 +27685,7 @@
           <a:p>
             <a:fld id="{3AE964CF-DFDF-4B9D-8AE5-9B4D54DD768C}" type="slidenum">
               <a:rPr lang="en-US" smtClean="0"/>
-              <a:t>6</a:t>
+              <a:t>7</a:t>
             </a:fld>
             <a:endParaRPr lang="en-US" dirty="0"/>
           </a:p>
@@ -27134,7 +27852,7 @@
 </p:sld>
 </file>
 
-<file path=ppt/slides/slide7.xml><?xml version="1.0" encoding="utf-8"?>
+<file path=ppt/slides/slide8.xml><?xml version="1.0" encoding="utf-8"?>
 <p:sld xmlns:a="http://schemas.openxmlformats.org/drawingml/2006/main" xmlns:r="http://schemas.openxmlformats.org/officeDocument/2006/relationships" xmlns:p="http://schemas.openxmlformats.org/presentationml/2006/main">
   <p:cSld>
     <p:spTree>
@@ -27275,7 +27993,7 @@
           <a:p>
             <a:fld id="{3AE964CF-DFDF-4B9D-8AE5-9B4D54DD768C}" type="slidenum">
               <a:rPr lang="en-US" smtClean="0"/>
-              <a:t>7</a:t>
+              <a:t>8</a:t>
             </a:fld>
             <a:endParaRPr lang="en-US" dirty="0"/>
           </a:p>
@@ -27560,7 +28278,7 @@
 </p:sld>
 </file>
 
-<file path=ppt/slides/slide8.xml><?xml version="1.0" encoding="utf-8"?>
+<file path=ppt/slides/slide9.xml><?xml version="1.0" encoding="utf-8"?>
 <p:sld xmlns:a="http://schemas.openxmlformats.org/drawingml/2006/main" xmlns:r="http://schemas.openxmlformats.org/officeDocument/2006/relationships" xmlns:p="http://schemas.openxmlformats.org/presentationml/2006/main">
   <p:cSld>
     <p:spTree>
@@ -27713,7 +28431,7 @@
           <a:p>
             <a:fld id="{3AE964CF-DFDF-4B9D-8AE5-9B4D54DD768C}" type="slidenum">
               <a:rPr lang="en-US" smtClean="0"/>
-              <a:t>8</a:t>
+              <a:t>9</a:t>
             </a:fld>
             <a:endParaRPr lang="en-US" dirty="0"/>
           </a:p>
@@ -28289,377 +29007,6 @@
       <p:bldP spid="5" grpId="0" animBg="1"/>
     </p:bldLst>
   </p:timing>
-</p:sld>
-</file>
-
-<file path=ppt/slides/slide9.xml><?xml version="1.0" encoding="utf-8"?>
-<p:sld xmlns:a="http://schemas.openxmlformats.org/drawingml/2006/main" xmlns:r="http://schemas.openxmlformats.org/officeDocument/2006/relationships" xmlns:p="http://schemas.openxmlformats.org/presentationml/2006/main">
-  <p:cSld>
-    <p:spTree>
-      <p:nvGrpSpPr>
-        <p:cNvPr id="1" name=""/>
-        <p:cNvGrpSpPr/>
-        <p:nvPr/>
-      </p:nvGrpSpPr>
-      <p:grpSpPr>
-        <a:xfrm>
-          <a:off x="0" y="0"/>
-          <a:ext cx="0" cy="0"/>
-          <a:chOff x="0" y="0"/>
-          <a:chExt cx="0" cy="0"/>
-        </a:xfrm>
-      </p:grpSpPr>
-      <p:sp>
-        <p:nvSpPr>
-          <p:cNvPr id="2" name="Title 1"/>
-          <p:cNvSpPr>
-            <a:spLocks noGrp="1"/>
-          </p:cNvSpPr>
-          <p:nvPr>
-            <p:ph type="title"/>
-          </p:nvPr>
-        </p:nvSpPr>
-        <p:spPr/>
-        <p:txBody>
-          <a:bodyPr/>
-          <a:lstStyle/>
-          <a:p>
-            <a:r>
-              <a:rPr lang="en-US" dirty="0"/>
-              <a:t>DNX – Start Web Server</a:t>
-            </a:r>
-          </a:p>
-        </p:txBody>
-      </p:sp>
-      <p:sp>
-        <p:nvSpPr>
-          <p:cNvPr id="3" name="Content Placeholder 2"/>
-          <p:cNvSpPr>
-            <a:spLocks noGrp="1"/>
-          </p:cNvSpPr>
-          <p:nvPr>
-            <p:ph idx="1"/>
-          </p:nvPr>
-        </p:nvSpPr>
-        <p:spPr>
-          <a:xfrm>
-            <a:off x="677334" y="1595439"/>
-            <a:ext cx="8596668" cy="4445924"/>
-          </a:xfrm>
-        </p:spPr>
-        <p:txBody>
-          <a:bodyPr/>
-          <a:lstStyle/>
-          <a:p>
-            <a:pPr marL="0" indent="0">
-              <a:buNone/>
-            </a:pPr>
-            <a:endParaRPr lang="en-US" b="1" dirty="0">
-              <a:latin typeface="Consolas" panose="020B0609020204030204" pitchFamily="49" charset="0"/>
-              <a:cs typeface="Consolas" panose="020B0609020204030204" pitchFamily="49" charset="0"/>
-            </a:endParaRPr>
-          </a:p>
-          <a:p>
-            <a:pPr marL="0" indent="0">
-              <a:buNone/>
-            </a:pPr>
-            <a:r>
-              <a:rPr lang="en-US" b="1" dirty="0">
-                <a:latin typeface="Consolas" panose="020B0609020204030204" pitchFamily="49" charset="0"/>
-                <a:cs typeface="Consolas" panose="020B0609020204030204" pitchFamily="49" charset="0"/>
-              </a:rPr>
-              <a:t>&gt; dnx web</a:t>
-            </a:r>
-          </a:p>
-        </p:txBody>
-      </p:sp>
-      <p:sp>
-        <p:nvSpPr>
-          <p:cNvPr id="4" name="Slide Number Placeholder 3"/>
-          <p:cNvSpPr>
-            <a:spLocks noGrp="1"/>
-          </p:cNvSpPr>
-          <p:nvPr>
-            <p:ph type="sldNum" sz="quarter" idx="12"/>
-          </p:nvPr>
-        </p:nvSpPr>
-        <p:spPr/>
-        <p:txBody>
-          <a:bodyPr/>
-          <a:lstStyle/>
-          <a:p>
-            <a:fld id="{3AE964CF-DFDF-4B9D-8AE5-9B4D54DD768C}" type="slidenum">
-              <a:rPr lang="en-US" smtClean="0"/>
-              <a:t>9</a:t>
-            </a:fld>
-            <a:endParaRPr lang="en-US" dirty="0"/>
-          </a:p>
-        </p:txBody>
-      </p:sp>
-      <p:pic>
-        <p:nvPicPr>
-          <p:cNvPr id="6" name="Picture 5"/>
-          <p:cNvPicPr>
-            <a:picLocks noChangeAspect="1"/>
-          </p:cNvPicPr>
-          <p:nvPr/>
-        </p:nvPicPr>
-        <p:blipFill>
-          <a:blip r:embed="rId2"/>
-          <a:stretch>
-            <a:fillRect/>
-          </a:stretch>
-        </p:blipFill>
-        <p:spPr>
-          <a:xfrm>
-            <a:off x="390253" y="3589860"/>
-            <a:ext cx="5053693" cy="1563339"/>
-          </a:xfrm>
-          <a:prstGeom prst="rect">
-            <a:avLst/>
-          </a:prstGeom>
-        </p:spPr>
-      </p:pic>
-      <mc:AlternateContent xmlns:mc="http://schemas.openxmlformats.org/markup-compatibility/2006" xmlns:we="http://schemas.microsoft.com/office/webextensions/webextension/2010/11" xmlns:pca="http://schemas.microsoft.com/office/powerpoint/2013/contentapp">
-        <mc:Choice Requires="we pca">
-          <p:graphicFrame>
-            <p:nvGraphicFramePr>
-              <p:cNvPr id="7" name="Add-in 6" title="Code Presenter Pro"/>
-              <p:cNvGraphicFramePr>
-                <a:graphicFrameLocks noGrp="1"/>
-              </p:cNvGraphicFramePr>
-              <p:nvPr>
-                <p:extLst>
-                  <p:ext uri="{D42A27DB-BD31-4B8C-83A1-F6EECF244321}">
-                    <p14:modId xmlns:p14="http://schemas.microsoft.com/office/powerpoint/2010/main" val="3251799261"/>
-                  </p:ext>
-                </p:extLst>
-              </p:nvPr>
-            </p:nvGraphicFramePr>
-            <p:xfrm>
-              <a:off x="3505194" y="1891623"/>
-              <a:ext cx="6055889" cy="1651677"/>
-            </p:xfrm>
-            <a:graphic>
-              <a:graphicData uri="http://schemas.microsoft.com/office/webextensions/webextension/2010/11">
-                <we:webextensionref xmlns:we="http://schemas.microsoft.com/office/webextensions/webextension/2010/11" xmlns:r="http://schemas.openxmlformats.org/officeDocument/2006/relationships" r:id="rId3"/>
-              </a:graphicData>
-            </a:graphic>
-          </p:graphicFrame>
-        </mc:Choice>
-        <mc:Fallback xmlns="">
-          <p:pic>
-            <p:nvPicPr>
-              <p:cNvPr id="7" name="Add-in 6" title="Code Presenter Pro"/>
-              <p:cNvPicPr>
-                <a:picLocks noGrp="1" noRot="1" noChangeAspect="1" noMove="1" noResize="1" noEditPoints="1" noAdjustHandles="1" noChangeArrowheads="1" noChangeShapeType="1"/>
-              </p:cNvPicPr>
-              <p:nvPr/>
-            </p:nvPicPr>
-            <p:blipFill>
-              <a:blip r:embed="rId4"/>
-              <a:stretch>
-                <a:fillRect/>
-              </a:stretch>
-            </p:blipFill>
-            <p:spPr>
-              <a:xfrm>
-                <a:off x="3505194" y="1891623"/>
-                <a:ext cx="6055889" cy="1651677"/>
-              </a:xfrm>
-              <a:prstGeom prst="rect">
-                <a:avLst/>
-              </a:prstGeom>
-            </p:spPr>
-          </p:pic>
-        </mc:Fallback>
-      </mc:AlternateContent>
-      <p:sp>
-        <p:nvSpPr>
-          <p:cNvPr id="8" name="Right Arrow 7"/>
-          <p:cNvSpPr/>
-          <p:nvPr/>
-        </p:nvSpPr>
-        <p:spPr>
-          <a:xfrm>
-            <a:off x="2111828" y="1977801"/>
-            <a:ext cx="1225720" cy="458786"/>
-          </a:xfrm>
-          <a:prstGeom prst="rightArrow">
-            <a:avLst/>
-          </a:prstGeom>
-        </p:spPr>
-        <p:style>
-          <a:lnRef idx="1">
-            <a:schemeClr val="accent2"/>
-          </a:lnRef>
-          <a:fillRef idx="2">
-            <a:schemeClr val="accent2"/>
-          </a:fillRef>
-          <a:effectRef idx="1">
-            <a:schemeClr val="accent2"/>
-          </a:effectRef>
-          <a:fontRef idx="minor">
-            <a:schemeClr val="dk1"/>
-          </a:fontRef>
-        </p:style>
-        <p:txBody>
-          <a:bodyPr rtlCol="0" anchor="ctr"/>
-          <a:lstStyle/>
-          <a:p>
-            <a:pPr algn="ctr"/>
-            <a:r>
-              <a:rPr lang="en-US" dirty="0"/>
-              <a:t>Execute</a:t>
-            </a:r>
-          </a:p>
-        </p:txBody>
-      </p:sp>
-      <p:sp>
-        <p:nvSpPr>
-          <p:cNvPr id="9" name="TextBox 8"/>
-          <p:cNvSpPr txBox="1"/>
-          <p:nvPr/>
-        </p:nvSpPr>
-        <p:spPr>
-          <a:xfrm>
-            <a:off x="3429867" y="1505345"/>
-            <a:ext cx="5897371" cy="369332"/>
-          </a:xfrm>
-          <a:prstGeom prst="rect">
-            <a:avLst/>
-          </a:prstGeom>
-          <a:noFill/>
-        </p:spPr>
-        <p:txBody>
-          <a:bodyPr wrap="square" rtlCol="0">
-            <a:spAutoFit/>
-          </a:bodyPr>
-          <a:lstStyle/>
-          <a:p>
-            <a:r>
-              <a:rPr lang="en-US" u="sng" dirty="0"/>
-              <a:t>project.json</a:t>
-            </a:r>
-          </a:p>
-        </p:txBody>
-      </p:sp>
-      <p:sp>
-        <p:nvSpPr>
-          <p:cNvPr id="10" name="Left Arrow 9"/>
-          <p:cNvSpPr/>
-          <p:nvPr/>
-        </p:nvSpPr>
-        <p:spPr>
-          <a:xfrm rot="19188924">
-            <a:off x="2488007" y="2828227"/>
-            <a:ext cx="985157" cy="510891"/>
-          </a:xfrm>
-          <a:prstGeom prst="leftArrow">
-            <a:avLst/>
-          </a:prstGeom>
-        </p:spPr>
-        <p:style>
-          <a:lnRef idx="1">
-            <a:schemeClr val="accent2"/>
-          </a:lnRef>
-          <a:fillRef idx="2">
-            <a:schemeClr val="accent2"/>
-          </a:fillRef>
-          <a:effectRef idx="1">
-            <a:schemeClr val="accent2"/>
-          </a:effectRef>
-          <a:fontRef idx="minor">
-            <a:schemeClr val="dk1"/>
-          </a:fontRef>
-        </p:style>
-        <p:txBody>
-          <a:bodyPr rtlCol="0" anchor="ctr"/>
-          <a:lstStyle/>
-          <a:p>
-            <a:pPr algn="ctr"/>
-            <a:r>
-              <a:rPr lang="en-US" dirty="0"/>
-              <a:t>Start</a:t>
-            </a:r>
-          </a:p>
-        </p:txBody>
-      </p:sp>
-      <p:pic>
-        <p:nvPicPr>
-          <p:cNvPr id="11" name="Picture 10"/>
-          <p:cNvPicPr>
-            <a:picLocks noChangeAspect="1"/>
-          </p:cNvPicPr>
-          <p:nvPr/>
-        </p:nvPicPr>
-        <p:blipFill>
-          <a:blip r:embed="rId5"/>
-          <a:stretch>
-            <a:fillRect/>
-          </a:stretch>
-        </p:blipFill>
-        <p:spPr>
-          <a:xfrm>
-            <a:off x="6825644" y="3589860"/>
-            <a:ext cx="9614505" cy="7589894"/>
-          </a:xfrm>
-          <a:prstGeom prst="rect">
-            <a:avLst/>
-          </a:prstGeom>
-        </p:spPr>
-      </p:pic>
-      <p:sp>
-        <p:nvSpPr>
-          <p:cNvPr id="13" name="Right Arrow 12"/>
-          <p:cNvSpPr/>
-          <p:nvPr/>
-        </p:nvSpPr>
-        <p:spPr>
-          <a:xfrm>
-            <a:off x="5520456" y="4040809"/>
-            <a:ext cx="1225720" cy="458786"/>
-          </a:xfrm>
-          <a:prstGeom prst="rightArrow">
-            <a:avLst/>
-          </a:prstGeom>
-        </p:spPr>
-        <p:style>
-          <a:lnRef idx="1">
-            <a:schemeClr val="accent2"/>
-          </a:lnRef>
-          <a:fillRef idx="2">
-            <a:schemeClr val="accent2"/>
-          </a:fillRef>
-          <a:effectRef idx="1">
-            <a:schemeClr val="accent2"/>
-          </a:effectRef>
-          <a:fontRef idx="minor">
-            <a:schemeClr val="dk1"/>
-          </a:fontRef>
-        </p:style>
-        <p:txBody>
-          <a:bodyPr rtlCol="0" anchor="ctr"/>
-          <a:lstStyle/>
-          <a:p>
-            <a:pPr algn="ctr"/>
-            <a:r>
-              <a:rPr lang="en-US" dirty="0"/>
-              <a:t>Browse</a:t>
-            </a:r>
-          </a:p>
-        </p:txBody>
-      </p:sp>
-    </p:spTree>
-    <p:extLst>
-      <p:ext uri="{BB962C8B-B14F-4D97-AF65-F5344CB8AC3E}">
-        <p14:creationId xmlns:p14="http://schemas.microsoft.com/office/powerpoint/2010/main" val="21192055"/>
-      </p:ext>
-    </p:extLst>
-  </p:cSld>
-  <p:clrMapOvr>
-    <a:masterClrMapping/>
-  </p:clrMapOvr>
 </p:sld>
 </file>
 

</xml_diff>

<commit_message>
Correct error on Command Mappings slide
</commit_message>
<xml_diff>
--- a/Getting Started with ASP.NET Core 1.0 in VS Code - CCC.pptx
+++ b/Getting Started with ASP.NET Core 1.0 in VS Code - CCC.pptx
@@ -4206,8 +4206,8 @@
     <dgm:cxn modelId="{BE4D6236-A3E0-4057-9A2C-42D4A877D36E}" type="presOf" srcId="{8A45336E-5408-4D62-9EF1-08F486318BFF}" destId="{57863176-DB12-4225-A941-96CD5A6A82CC}" srcOrd="0" destOrd="0" presId="urn:microsoft.com/office/officeart/2005/8/layout/hChevron3"/>
     <dgm:cxn modelId="{1C1D83E0-DB0F-4A9B-A04D-A392BE0DD04C}" type="presOf" srcId="{AFF4B1FA-9A6B-43F7-B8CB-4C91CF1DDBE0}" destId="{6E8A8CB1-126C-4A8D-95E5-7D016B2029F2}" srcOrd="0" destOrd="0" presId="urn:microsoft.com/office/officeart/2005/8/layout/hChevron3"/>
     <dgm:cxn modelId="{DCD6A15A-B19C-4616-9ED1-26DCB2C43285}" srcId="{8A45336E-5408-4D62-9EF1-08F486318BFF}" destId="{8BEAE8CB-A7D8-45E4-BC87-9A18CED7E7CE}" srcOrd="0" destOrd="0" parTransId="{E16CB781-B1BB-4E9E-9C86-96F481B14BFA}" sibTransId="{48747E02-CA4B-4EA6-9401-0110B1D75C1C}"/>
+    <dgm:cxn modelId="{94C1853C-02E7-4C27-A29A-FC84C3187A32}" srcId="{8A45336E-5408-4D62-9EF1-08F486318BFF}" destId="{A917A1F9-17B7-4B88-9FAD-AF41E2910DBD}" srcOrd="3" destOrd="0" parTransId="{FEFD055D-8110-41D2-83FF-BB68E3C24098}" sibTransId="{A2ABC1CA-D4DB-4C0F-83FD-5DAA1C23AAEA}"/>
     <dgm:cxn modelId="{C70A686A-14B0-4CBB-AA56-4BFD6C2C7B89}" type="presOf" srcId="{766D0765-5B45-432B-826E-9A27A845A5A7}" destId="{F0AA213A-C7FF-4409-B147-991ABB26AAB2}" srcOrd="0" destOrd="0" presId="urn:microsoft.com/office/officeart/2005/8/layout/hChevron3"/>
-    <dgm:cxn modelId="{94C1853C-02E7-4C27-A29A-FC84C3187A32}" srcId="{8A45336E-5408-4D62-9EF1-08F486318BFF}" destId="{A917A1F9-17B7-4B88-9FAD-AF41E2910DBD}" srcOrd="3" destOrd="0" parTransId="{FEFD055D-8110-41D2-83FF-BB68E3C24098}" sibTransId="{A2ABC1CA-D4DB-4C0F-83FD-5DAA1C23AAEA}"/>
     <dgm:cxn modelId="{9CC9A370-689E-4C6F-B870-78ECD0BA24BE}" type="presOf" srcId="{A917A1F9-17B7-4B88-9FAD-AF41E2910DBD}" destId="{6655FB27-B27C-4A7B-B55D-EF2C08C6B65E}" srcOrd="0" destOrd="0" presId="urn:microsoft.com/office/officeart/2005/8/layout/hChevron3"/>
     <dgm:cxn modelId="{128E7390-4262-4560-BB4D-C552847BC8AE}" type="presOf" srcId="{8BEAE8CB-A7D8-45E4-BC87-9A18CED7E7CE}" destId="{54F0ADA0-D0DF-4213-9ACF-ED13172B50C7}" srcOrd="0" destOrd="0" presId="urn:microsoft.com/office/officeart/2005/8/layout/hChevron3"/>
     <dgm:cxn modelId="{CB4508D6-DCB1-41A9-9031-BAB1F7FDDC1E}" type="presParOf" srcId="{57863176-DB12-4225-A941-96CD5A6A82CC}" destId="{54F0ADA0-D0DF-4213-9ACF-ED13172B50C7}" srcOrd="0" destOrd="0" presId="urn:microsoft.com/office/officeart/2005/8/layout/hChevron3"/>
@@ -24906,7 +24906,7 @@
             <p:ph idx="1"/>
             <p:extLst>
               <p:ext uri="{D42A27DB-BD31-4B8C-83A1-F6EECF244321}">
-                <p14:modId xmlns:p14="http://schemas.microsoft.com/office/powerpoint/2010/main" val="2338640179"/>
+                <p14:modId xmlns:p14="http://schemas.microsoft.com/office/powerpoint/2010/main" val="1821507427"/>
               </p:ext>
             </p:extLst>
           </p:nvPr>
@@ -25069,7 +25069,7 @@
                         <a:rPr lang="en-US" sz="2200" dirty="0">
                           <a:latin typeface="Consolas" panose="020B0609020204030204" pitchFamily="49" charset="0"/>
                         </a:rPr>
-                        <a:t>dotnet compile/build</a:t>
+                        <a:t>dotnet build</a:t>
                       </a:r>
                     </a:p>
                   </a:txBody>
@@ -25405,21 +25405,7 @@
                 <a:latin typeface="Consolas" panose="020B0609020204030204" pitchFamily="49" charset="0"/>
                 <a:cs typeface="Consolas" panose="020B0609020204030204" pitchFamily="49" charset="0"/>
               </a:rPr>
-              <a:t> </a:t>
-            </a:r>
-            <a:r>
-              <a:rPr lang="en-US" dirty="0" err="1">
-                <a:latin typeface="Consolas" panose="020B0609020204030204" pitchFamily="49" charset="0"/>
-                <a:cs typeface="Consolas" panose="020B0609020204030204" pitchFamily="49" charset="0"/>
-              </a:rPr>
-              <a:t>dotnet</a:t>
-            </a:r>
-            <a:r>
-              <a:rPr lang="en-US" dirty="0">
-                <a:latin typeface="Consolas" panose="020B0609020204030204" pitchFamily="49" charset="0"/>
-                <a:cs typeface="Consolas" panose="020B0609020204030204" pitchFamily="49" charset="0"/>
-              </a:rPr>
-              <a:t> Demo</a:t>
+              <a:t> dotnet Demo</a:t>
             </a:r>
             <a:r>
               <a:rPr lang="en-US" dirty="0"/>
@@ -26477,11 +26463,11 @@
   <p:clrMapOvr>
     <a:masterClrMapping/>
   </p:clrMapOvr>
-  <mc:AlternateContent xmlns:mc="http://schemas.openxmlformats.org/markup-compatibility/2006">
-    <mc:Choice xmlns:p14="http://schemas.microsoft.com/office/powerpoint/2010/main" Requires="p14">
+  <mc:AlternateContent xmlns:mc="http://schemas.openxmlformats.org/markup-compatibility/2006" xmlns:p14="http://schemas.microsoft.com/office/powerpoint/2010/main">
+    <mc:Choice Requires="p14">
       <p:transition spd="slow" p14:dur="2000" advTm="8000"/>
     </mc:Choice>
-    <mc:Fallback>
+    <mc:Fallback xmlns="">
       <p:transition spd="slow" advTm="8000"/>
     </mc:Fallback>
   </mc:AlternateContent>

</xml_diff>